<commit_message>
Cleaned up Dynamic Language Design Sequence Slide
</commit_message>
<xml_diff>
--- a/array paper.pptx
+++ b/array paper.pptx
@@ -5,9 +5,9 @@
     <p:sldMasterId id="2147483648" r:id="rId1"/>
   </p:sldMasterIdLst>
   <p:sldIdLst>
-    <p:sldId id="256" r:id="rId2"/>
-    <p:sldId id="257" r:id="rId3"/>
-    <p:sldId id="258" r:id="rId4"/>
+    <p:sldId id="258" r:id="rId2"/>
+    <p:sldId id="256" r:id="rId3"/>
+    <p:sldId id="257" r:id="rId4"/>
     <p:sldId id="259" r:id="rId5"/>
     <p:sldId id="260" r:id="rId6"/>
   </p:sldIdLst>
@@ -292,7 +292,7 @@
           <a:p>
             <a:fld id="{0869F44F-958A-C743-BC1B-A264CA35282B}" type="datetimeFigureOut">
               <a:rPr lang="en-US" smtClean="0"/>
-              <a:t>4/7/14</a:t>
+              <a:t>4/8/14</a:t>
             </a:fld>
             <a:endParaRPr lang="en-US"/>
           </a:p>
@@ -462,7 +462,7 @@
           <a:p>
             <a:fld id="{0869F44F-958A-C743-BC1B-A264CA35282B}" type="datetimeFigureOut">
               <a:rPr lang="en-US" smtClean="0"/>
-              <a:t>4/7/14</a:t>
+              <a:t>4/8/14</a:t>
             </a:fld>
             <a:endParaRPr lang="en-US"/>
           </a:p>
@@ -642,7 +642,7 @@
           <a:p>
             <a:fld id="{0869F44F-958A-C743-BC1B-A264CA35282B}" type="datetimeFigureOut">
               <a:rPr lang="en-US" smtClean="0"/>
-              <a:t>4/7/14</a:t>
+              <a:t>4/8/14</a:t>
             </a:fld>
             <a:endParaRPr lang="en-US"/>
           </a:p>
@@ -812,7 +812,7 @@
           <a:p>
             <a:fld id="{0869F44F-958A-C743-BC1B-A264CA35282B}" type="datetimeFigureOut">
               <a:rPr lang="en-US" smtClean="0"/>
-              <a:t>4/7/14</a:t>
+              <a:t>4/8/14</a:t>
             </a:fld>
             <a:endParaRPr lang="en-US"/>
           </a:p>
@@ -1058,7 +1058,7 @@
           <a:p>
             <a:fld id="{0869F44F-958A-C743-BC1B-A264CA35282B}" type="datetimeFigureOut">
               <a:rPr lang="en-US" smtClean="0"/>
-              <a:t>4/7/14</a:t>
+              <a:t>4/8/14</a:t>
             </a:fld>
             <a:endParaRPr lang="en-US"/>
           </a:p>
@@ -1346,7 +1346,7 @@
           <a:p>
             <a:fld id="{0869F44F-958A-C743-BC1B-A264CA35282B}" type="datetimeFigureOut">
               <a:rPr lang="en-US" smtClean="0"/>
-              <a:t>4/7/14</a:t>
+              <a:t>4/8/14</a:t>
             </a:fld>
             <a:endParaRPr lang="en-US"/>
           </a:p>
@@ -1768,7 +1768,7 @@
           <a:p>
             <a:fld id="{0869F44F-958A-C743-BC1B-A264CA35282B}" type="datetimeFigureOut">
               <a:rPr lang="en-US" smtClean="0"/>
-              <a:t>4/7/14</a:t>
+              <a:t>4/8/14</a:t>
             </a:fld>
             <a:endParaRPr lang="en-US"/>
           </a:p>
@@ -1886,7 +1886,7 @@
           <a:p>
             <a:fld id="{0869F44F-958A-C743-BC1B-A264CA35282B}" type="datetimeFigureOut">
               <a:rPr lang="en-US" smtClean="0"/>
-              <a:t>4/7/14</a:t>
+              <a:t>4/8/14</a:t>
             </a:fld>
             <a:endParaRPr lang="en-US"/>
           </a:p>
@@ -1981,7 +1981,7 @@
           <a:p>
             <a:fld id="{0869F44F-958A-C743-BC1B-A264CA35282B}" type="datetimeFigureOut">
               <a:rPr lang="en-US" smtClean="0"/>
-              <a:t>4/7/14</a:t>
+              <a:t>4/8/14</a:t>
             </a:fld>
             <a:endParaRPr lang="en-US"/>
           </a:p>
@@ -2258,7 +2258,7 @@
           <a:p>
             <a:fld id="{0869F44F-958A-C743-BC1B-A264CA35282B}" type="datetimeFigureOut">
               <a:rPr lang="en-US" smtClean="0"/>
-              <a:t>4/7/14</a:t>
+              <a:t>4/8/14</a:t>
             </a:fld>
             <a:endParaRPr lang="en-US"/>
           </a:p>
@@ -2511,7 +2511,7 @@
           <a:p>
             <a:fld id="{0869F44F-958A-C743-BC1B-A264CA35282B}" type="datetimeFigureOut">
               <a:rPr lang="en-US" smtClean="0"/>
-              <a:t>4/7/14</a:t>
+              <a:t>4/8/14</a:t>
             </a:fld>
             <a:endParaRPr lang="en-US"/>
           </a:p>
@@ -2724,7 +2724,7 @@
           <a:p>
             <a:fld id="{0869F44F-958A-C743-BC1B-A264CA35282B}" type="datetimeFigureOut">
               <a:rPr lang="en-US" smtClean="0"/>
-              <a:t>4/7/14</a:t>
+              <a:t>4/8/14</a:t>
             </a:fld>
             <a:endParaRPr lang="en-US"/>
           </a:p>
@@ -3107,6 +3107,2452 @@
         </p:nvSpPr>
         <p:spPr>
           <a:xfrm>
+            <a:off x="207017" y="1335004"/>
+            <a:ext cx="8682555" cy="2031325"/>
+          </a:xfrm>
+          <a:prstGeom prst="rect">
+            <a:avLst/>
+          </a:prstGeom>
+          <a:noFill/>
+        </p:spPr>
+        <p:txBody>
+          <a:bodyPr wrap="square" rtlCol="0">
+            <a:spAutoFit/>
+          </a:bodyPr>
+          <a:lstStyle/>
+          <a:p>
+            <a:r>
+              <a:rPr lang="en-US" dirty="0" smtClean="0"/>
+              <a:t>(</a:t>
+            </a:r>
+            <a:r>
+              <a:rPr lang="en-US" dirty="0" smtClean="0"/>
+              <a:t>1) Design Language                                    (2)  Design an Analysis</a:t>
+            </a:r>
+          </a:p>
+          <a:p>
+            <a:endParaRPr lang="en-US" dirty="0" smtClean="0"/>
+          </a:p>
+          <a:p>
+            <a:endParaRPr lang="en-US" dirty="0" smtClean="0"/>
+          </a:p>
+          <a:p>
+            <a:endParaRPr lang="en-US" dirty="0" smtClean="0"/>
+          </a:p>
+          <a:p>
+            <a:endParaRPr lang="en-US" dirty="0" smtClean="0"/>
+          </a:p>
+          <a:p>
+            <a:endParaRPr lang="en-US" dirty="0" smtClean="0"/>
+          </a:p>
+          <a:p>
+            <a:endParaRPr lang="en-US" dirty="0" smtClean="0"/>
+          </a:p>
+        </p:txBody>
+      </p:sp>
+      <p:sp>
+        <p:nvSpPr>
+          <p:cNvPr id="9" name="Curved Down Arrow 8"/>
+          <p:cNvSpPr/>
+          <p:nvPr/>
+        </p:nvSpPr>
+        <p:spPr>
+          <a:xfrm>
+            <a:off x="2010790" y="3476777"/>
+            <a:ext cx="1683352" cy="731520"/>
+          </a:xfrm>
+          <a:prstGeom prst="curvedDownArrow">
+            <a:avLst/>
+          </a:prstGeom>
+          <a:solidFill>
+            <a:srgbClr val="000000"/>
+          </a:solidFill>
+        </p:spPr>
+        <p:style>
+          <a:lnRef idx="1">
+            <a:schemeClr val="accent1"/>
+          </a:lnRef>
+          <a:fillRef idx="3">
+            <a:schemeClr val="accent1"/>
+          </a:fillRef>
+          <a:effectRef idx="2">
+            <a:schemeClr val="accent1"/>
+          </a:effectRef>
+          <a:fontRef idx="minor">
+            <a:schemeClr val="lt1"/>
+          </a:fontRef>
+        </p:style>
+        <p:txBody>
+          <a:bodyPr rtlCol="0" anchor="ctr"/>
+          <a:lstStyle/>
+          <a:p>
+            <a:pPr algn="ctr"/>
+            <a:endParaRPr lang="en-US">
+              <a:solidFill>
+                <a:schemeClr val="tx1"/>
+              </a:solidFill>
+            </a:endParaRPr>
+          </a:p>
+        </p:txBody>
+      </p:sp>
+      <p:sp>
+        <p:nvSpPr>
+          <p:cNvPr id="10" name="Curved Down Arrow 9"/>
+          <p:cNvSpPr/>
+          <p:nvPr/>
+        </p:nvSpPr>
+        <p:spPr>
+          <a:xfrm rot="10636884">
+            <a:off x="1927442" y="4538966"/>
+            <a:ext cx="1701650" cy="731520"/>
+          </a:xfrm>
+          <a:prstGeom prst="curvedDownArrow">
+            <a:avLst/>
+          </a:prstGeom>
+          <a:solidFill>
+            <a:srgbClr val="000000"/>
+          </a:solidFill>
+        </p:spPr>
+        <p:style>
+          <a:lnRef idx="1">
+            <a:schemeClr val="accent1"/>
+          </a:lnRef>
+          <a:fillRef idx="3">
+            <a:schemeClr val="accent1"/>
+          </a:fillRef>
+          <a:effectRef idx="2">
+            <a:schemeClr val="accent1"/>
+          </a:effectRef>
+          <a:fontRef idx="minor">
+            <a:schemeClr val="lt1"/>
+          </a:fontRef>
+        </p:style>
+        <p:txBody>
+          <a:bodyPr rtlCol="0" anchor="ctr"/>
+          <a:lstStyle/>
+          <a:p>
+            <a:pPr algn="ctr"/>
+            <a:endParaRPr lang="en-US">
+              <a:solidFill>
+                <a:schemeClr val="tx1"/>
+              </a:solidFill>
+            </a:endParaRPr>
+          </a:p>
+        </p:txBody>
+      </p:sp>
+      <p:sp>
+        <p:nvSpPr>
+          <p:cNvPr id="11" name="TextBox 10"/>
+          <p:cNvSpPr txBox="1"/>
+          <p:nvPr/>
+        </p:nvSpPr>
+        <p:spPr>
+          <a:xfrm>
+            <a:off x="2010790" y="165802"/>
+            <a:ext cx="5481163" cy="523220"/>
+          </a:xfrm>
+          <a:prstGeom prst="rect">
+            <a:avLst/>
+          </a:prstGeom>
+          <a:noFill/>
+        </p:spPr>
+        <p:txBody>
+          <a:bodyPr wrap="none" rtlCol="0">
+            <a:spAutoFit/>
+          </a:bodyPr>
+          <a:lstStyle/>
+          <a:p>
+            <a:r>
+              <a:rPr lang="en-US" sz="2800" dirty="0" smtClean="0"/>
+              <a:t>Dynamic Language </a:t>
+            </a:r>
+            <a:r>
+              <a:rPr lang="en-US" sz="2800" dirty="0" smtClean="0"/>
+              <a:t>Design Sequence  </a:t>
+            </a:r>
+            <a:endParaRPr lang="en-US" sz="2800" dirty="0"/>
+          </a:p>
+        </p:txBody>
+      </p:sp>
+      <p:sp>
+        <p:nvSpPr>
+          <p:cNvPr id="12" name="TextBox 11"/>
+          <p:cNvSpPr txBox="1"/>
+          <p:nvPr/>
+        </p:nvSpPr>
+        <p:spPr>
+          <a:xfrm>
+            <a:off x="324857" y="4107799"/>
+            <a:ext cx="1759804" cy="369332"/>
+          </a:xfrm>
+          <a:prstGeom prst="rect">
+            <a:avLst/>
+          </a:prstGeom>
+          <a:noFill/>
+        </p:spPr>
+        <p:txBody>
+          <a:bodyPr wrap="none" rtlCol="0">
+            <a:spAutoFit/>
+          </a:bodyPr>
+          <a:lstStyle/>
+          <a:p>
+            <a:r>
+              <a:rPr lang="en-US" dirty="0" smtClean="0"/>
+              <a:t>Design Language</a:t>
+            </a:r>
+            <a:endParaRPr lang="en-US" dirty="0"/>
+          </a:p>
+        </p:txBody>
+      </p:sp>
+      <p:sp>
+        <p:nvSpPr>
+          <p:cNvPr id="13" name="TextBox 12"/>
+          <p:cNvSpPr txBox="1"/>
+          <p:nvPr/>
+        </p:nvSpPr>
+        <p:spPr>
+          <a:xfrm>
+            <a:off x="3645483" y="4129690"/>
+            <a:ext cx="1907343" cy="369332"/>
+          </a:xfrm>
+          <a:prstGeom prst="rect">
+            <a:avLst/>
+          </a:prstGeom>
+          <a:noFill/>
+        </p:spPr>
+        <p:txBody>
+          <a:bodyPr wrap="none" rtlCol="0">
+            <a:spAutoFit/>
+          </a:bodyPr>
+          <a:lstStyle/>
+          <a:p>
+            <a:r>
+              <a:rPr lang="en-US" dirty="0" smtClean="0"/>
+              <a:t>Design an Analysis</a:t>
+            </a:r>
+            <a:endParaRPr lang="en-US" dirty="0"/>
+          </a:p>
+        </p:txBody>
+      </p:sp>
+      <p:sp>
+        <p:nvSpPr>
+          <p:cNvPr id="14" name="TextBox 13"/>
+          <p:cNvSpPr txBox="1"/>
+          <p:nvPr/>
+        </p:nvSpPr>
+        <p:spPr>
+          <a:xfrm>
+            <a:off x="665180" y="1678715"/>
+            <a:ext cx="2980303" cy="369332"/>
+          </a:xfrm>
+          <a:prstGeom prst="rect">
+            <a:avLst/>
+          </a:prstGeom>
+          <a:noFill/>
+        </p:spPr>
+        <p:txBody>
+          <a:bodyPr wrap="none" rtlCol="0">
+            <a:spAutoFit/>
+          </a:bodyPr>
+          <a:lstStyle/>
+          <a:p>
+            <a:r>
+              <a:rPr lang="en-US" dirty="0" smtClean="0"/>
+              <a:t>e.g. </a:t>
+            </a:r>
+            <a:r>
+              <a:rPr lang="en-US" dirty="0" err="1" smtClean="0"/>
+              <a:t>Mathematica</a:t>
+            </a:r>
+            <a:r>
+              <a:rPr lang="en-US" dirty="0" smtClean="0"/>
+              <a:t>, R, </a:t>
+            </a:r>
+            <a:r>
+              <a:rPr lang="en-US" dirty="0" smtClean="0"/>
+              <a:t>MATLAB</a:t>
+            </a:r>
+            <a:endParaRPr lang="en-US" dirty="0"/>
+          </a:p>
+        </p:txBody>
+      </p:sp>
+      <p:sp>
+        <p:nvSpPr>
+          <p:cNvPr id="15" name="TextBox 14"/>
+          <p:cNvSpPr txBox="1"/>
+          <p:nvPr/>
+        </p:nvSpPr>
+        <p:spPr>
+          <a:xfrm>
+            <a:off x="324857" y="5351195"/>
+            <a:ext cx="7615599" cy="1477328"/>
+          </a:xfrm>
+          <a:prstGeom prst="rect">
+            <a:avLst/>
+          </a:prstGeom>
+          <a:noFill/>
+        </p:spPr>
+        <p:txBody>
+          <a:bodyPr wrap="none" rtlCol="0">
+            <a:spAutoFit/>
+          </a:bodyPr>
+          <a:lstStyle/>
+          <a:p>
+            <a:r>
+              <a:rPr lang="en-US" dirty="0" smtClean="0"/>
+              <a:t>Caption:  Dynamic languages are often designed first by one individual or team,</a:t>
+            </a:r>
+          </a:p>
+          <a:p>
+            <a:r>
+              <a:rPr lang="en-US" dirty="0" smtClean="0"/>
+              <a:t>and then “analysis design” comes later by others.  An analysis is a</a:t>
+            </a:r>
+          </a:p>
+          <a:p>
+            <a:r>
+              <a:rPr lang="en-US" dirty="0" smtClean="0"/>
+              <a:t>process </a:t>
+            </a:r>
+            <a:r>
+              <a:rPr lang="en-US" dirty="0" smtClean="0"/>
+              <a:t>to extract information from a </a:t>
+            </a:r>
+            <a:r>
+              <a:rPr lang="en-US" dirty="0" smtClean="0"/>
+              <a:t>program, for </a:t>
+            </a:r>
+            <a:r>
+              <a:rPr lang="en-US" dirty="0" smtClean="0"/>
+              <a:t>example types, </a:t>
+            </a:r>
+            <a:endParaRPr lang="en-US" dirty="0" smtClean="0"/>
+          </a:p>
+          <a:p>
+            <a:r>
+              <a:rPr lang="en-US" dirty="0" smtClean="0"/>
+              <a:t>whether </a:t>
+            </a:r>
+            <a:r>
+              <a:rPr lang="en-US" dirty="0" smtClean="0"/>
+              <a:t>a variable is defined, whether a loop </a:t>
+            </a:r>
+            <a:r>
+              <a:rPr lang="en-US" dirty="0" smtClean="0"/>
+              <a:t>terminates, etc.  In Julia the</a:t>
+            </a:r>
+          </a:p>
+          <a:p>
+            <a:r>
+              <a:rPr lang="en-US" dirty="0" smtClean="0"/>
+              <a:t>Analysis feeds back into the language design.</a:t>
+            </a:r>
+            <a:endParaRPr lang="en-US" dirty="0" smtClean="0"/>
+          </a:p>
+        </p:txBody>
+      </p:sp>
+      <p:sp>
+        <p:nvSpPr>
+          <p:cNvPr id="16" name="Right Arrow 15"/>
+          <p:cNvSpPr/>
+          <p:nvPr/>
+        </p:nvSpPr>
+        <p:spPr>
+          <a:xfrm>
+            <a:off x="2371540" y="1337827"/>
+            <a:ext cx="1579989" cy="406063"/>
+          </a:xfrm>
+          <a:prstGeom prst="rightArrow">
+            <a:avLst/>
+          </a:prstGeom>
+          <a:solidFill>
+            <a:schemeClr val="tx1"/>
+          </a:solidFill>
+        </p:spPr>
+        <p:style>
+          <a:lnRef idx="1">
+            <a:schemeClr val="accent1"/>
+          </a:lnRef>
+          <a:fillRef idx="3">
+            <a:schemeClr val="accent1"/>
+          </a:fillRef>
+          <a:effectRef idx="2">
+            <a:schemeClr val="accent1"/>
+          </a:effectRef>
+          <a:fontRef idx="minor">
+            <a:schemeClr val="lt1"/>
+          </a:fontRef>
+        </p:style>
+        <p:txBody>
+          <a:bodyPr rtlCol="0" anchor="ctr"/>
+          <a:lstStyle/>
+          <a:p>
+            <a:pPr algn="ctr"/>
+            <a:endParaRPr lang="en-US"/>
+          </a:p>
+        </p:txBody>
+      </p:sp>
+      <p:sp>
+        <p:nvSpPr>
+          <p:cNvPr id="2" name="TextBox 1"/>
+          <p:cNvSpPr txBox="1"/>
+          <p:nvPr/>
+        </p:nvSpPr>
+        <p:spPr>
+          <a:xfrm>
+            <a:off x="207017" y="790164"/>
+            <a:ext cx="2459853" cy="369332"/>
+          </a:xfrm>
+          <a:prstGeom prst="rect">
+            <a:avLst/>
+          </a:prstGeom>
+          <a:noFill/>
+        </p:spPr>
+        <p:txBody>
+          <a:bodyPr wrap="none" rtlCol="0">
+            <a:spAutoFit/>
+          </a:bodyPr>
+          <a:lstStyle/>
+          <a:p>
+            <a:r>
+              <a:rPr lang="en-US" dirty="0" smtClean="0"/>
+              <a:t>HISTORICAL APPROACH:</a:t>
+            </a:r>
+            <a:endParaRPr lang="en-US" dirty="0"/>
+          </a:p>
+        </p:txBody>
+      </p:sp>
+      <p:sp>
+        <p:nvSpPr>
+          <p:cNvPr id="3" name="Circular Arrow 2"/>
+          <p:cNvSpPr/>
+          <p:nvPr/>
+        </p:nvSpPr>
+        <p:spPr>
+          <a:xfrm rot="10800000">
+            <a:off x="5940070" y="1069639"/>
+            <a:ext cx="978408" cy="978408"/>
+          </a:xfrm>
+          <a:prstGeom prst="circularArrow">
+            <a:avLst>
+              <a:gd name="adj1" fmla="val 18310"/>
+              <a:gd name="adj2" fmla="val 1628627"/>
+              <a:gd name="adj3" fmla="val 18526967"/>
+              <a:gd name="adj4" fmla="val 2672208"/>
+              <a:gd name="adj5" fmla="val 19006"/>
+            </a:avLst>
+          </a:prstGeom>
+          <a:solidFill>
+            <a:srgbClr val="000000"/>
+          </a:solidFill>
+        </p:spPr>
+        <p:style>
+          <a:lnRef idx="1">
+            <a:schemeClr val="accent1"/>
+          </a:lnRef>
+          <a:fillRef idx="3">
+            <a:schemeClr val="accent1"/>
+          </a:fillRef>
+          <a:effectRef idx="2">
+            <a:schemeClr val="accent1"/>
+          </a:effectRef>
+          <a:fontRef idx="minor">
+            <a:schemeClr val="lt1"/>
+          </a:fontRef>
+        </p:style>
+        <p:txBody>
+          <a:bodyPr rtlCol="0" anchor="ctr"/>
+          <a:lstStyle/>
+          <a:p>
+            <a:pPr algn="ctr"/>
+            <a:endParaRPr lang="en-US">
+              <a:solidFill>
+                <a:schemeClr val="tx1"/>
+              </a:solidFill>
+            </a:endParaRPr>
+          </a:p>
+        </p:txBody>
+      </p:sp>
+      <p:pic>
+        <p:nvPicPr>
+          <p:cNvPr id="4" name="Picture 3"/>
+          <p:cNvPicPr>
+            <a:picLocks noChangeAspect="1"/>
+          </p:cNvPicPr>
+          <p:nvPr/>
+        </p:nvPicPr>
+        <p:blipFill>
+          <a:blip r:embed="rId2"/>
+          <a:stretch>
+            <a:fillRect/>
+          </a:stretch>
+        </p:blipFill>
+        <p:spPr>
+          <a:xfrm>
+            <a:off x="234547" y="3129839"/>
+            <a:ext cx="751521" cy="508171"/>
+          </a:xfrm>
+          <a:prstGeom prst="rect">
+            <a:avLst/>
+          </a:prstGeom>
+        </p:spPr>
+      </p:pic>
+      <p:sp>
+        <p:nvSpPr>
+          <p:cNvPr id="6" name="TextBox 5"/>
+          <p:cNvSpPr txBox="1"/>
+          <p:nvPr/>
+        </p:nvSpPr>
+        <p:spPr>
+          <a:xfrm>
+            <a:off x="1023695" y="3229771"/>
+            <a:ext cx="1297125" cy="369332"/>
+          </a:xfrm>
+          <a:prstGeom prst="rect">
+            <a:avLst/>
+          </a:prstGeom>
+          <a:noFill/>
+        </p:spPr>
+        <p:txBody>
+          <a:bodyPr wrap="none" rtlCol="0">
+            <a:spAutoFit/>
+          </a:bodyPr>
+          <a:lstStyle/>
+          <a:p>
+            <a:r>
+              <a:rPr lang="en-US" dirty="0" smtClean="0"/>
+              <a:t>APPROACH:</a:t>
+            </a:r>
+            <a:endParaRPr lang="en-US" dirty="0"/>
+          </a:p>
+        </p:txBody>
+      </p:sp>
+      <p:grpSp>
+        <p:nvGrpSpPr>
+          <p:cNvPr id="31" name="Group 30"/>
+          <p:cNvGrpSpPr/>
+          <p:nvPr/>
+        </p:nvGrpSpPr>
+        <p:grpSpPr>
+          <a:xfrm>
+            <a:off x="2317138" y="4097089"/>
+            <a:ext cx="193622" cy="526673"/>
+            <a:chOff x="5552826" y="2385007"/>
+            <a:chExt cx="397862" cy="1150705"/>
+          </a:xfrm>
+        </p:grpSpPr>
+        <p:sp>
+          <p:nvSpPr>
+            <p:cNvPr id="7" name="Oval 6"/>
+            <p:cNvSpPr/>
+            <p:nvPr/>
+          </p:nvSpPr>
+          <p:spPr>
+            <a:xfrm>
+              <a:off x="5552826" y="2385007"/>
+              <a:ext cx="387244" cy="388433"/>
+            </a:xfrm>
+            <a:prstGeom prst="ellipse">
+              <a:avLst/>
+            </a:prstGeom>
+            <a:noFill/>
+            <a:ln w="19050" cmpd="sng">
+              <a:solidFill>
+                <a:schemeClr val="tx1"/>
+              </a:solidFill>
+            </a:ln>
+          </p:spPr>
+          <p:style>
+            <a:lnRef idx="1">
+              <a:schemeClr val="accent1"/>
+            </a:lnRef>
+            <a:fillRef idx="3">
+              <a:schemeClr val="accent1"/>
+            </a:fillRef>
+            <a:effectRef idx="2">
+              <a:schemeClr val="accent1"/>
+            </a:effectRef>
+            <a:fontRef idx="minor">
+              <a:schemeClr val="lt1"/>
+            </a:fontRef>
+          </p:style>
+          <p:txBody>
+            <a:bodyPr rtlCol="0" anchor="ctr"/>
+            <a:lstStyle/>
+            <a:p>
+              <a:pPr algn="ctr"/>
+              <a:endParaRPr lang="en-US"/>
+            </a:p>
+          </p:txBody>
+        </p:sp>
+        <p:cxnSp>
+          <p:nvCxnSpPr>
+            <p:cNvPr id="20" name="Straight Connector 19"/>
+            <p:cNvCxnSpPr>
+              <a:stCxn id="7" idx="4"/>
+            </p:cNvCxnSpPr>
+            <p:nvPr/>
+          </p:nvCxnSpPr>
+          <p:spPr>
+            <a:xfrm>
+              <a:off x="5746448" y="2773440"/>
+              <a:ext cx="7565" cy="595712"/>
+            </a:xfrm>
+            <a:prstGeom prst="line">
+              <a:avLst/>
+            </a:prstGeom>
+            <a:ln>
+              <a:solidFill>
+                <a:srgbClr val="000000"/>
+              </a:solidFill>
+            </a:ln>
+          </p:spPr>
+          <p:style>
+            <a:lnRef idx="2">
+              <a:schemeClr val="accent1"/>
+            </a:lnRef>
+            <a:fillRef idx="0">
+              <a:schemeClr val="accent1"/>
+            </a:fillRef>
+            <a:effectRef idx="1">
+              <a:schemeClr val="accent1"/>
+            </a:effectRef>
+            <a:fontRef idx="minor">
+              <a:schemeClr val="tx1"/>
+            </a:fontRef>
+          </p:style>
+        </p:cxnSp>
+        <p:cxnSp>
+          <p:nvCxnSpPr>
+            <p:cNvPr id="25" name="Straight Connector 24"/>
+            <p:cNvCxnSpPr/>
+            <p:nvPr/>
+          </p:nvCxnSpPr>
+          <p:spPr>
+            <a:xfrm flipH="1">
+              <a:off x="5552826" y="2992337"/>
+              <a:ext cx="193622" cy="152400"/>
+            </a:xfrm>
+            <a:prstGeom prst="line">
+              <a:avLst/>
+            </a:prstGeom>
+            <a:ln>
+              <a:solidFill>
+                <a:srgbClr val="000000"/>
+              </a:solidFill>
+            </a:ln>
+          </p:spPr>
+          <p:style>
+            <a:lnRef idx="2">
+              <a:schemeClr val="accent1"/>
+            </a:lnRef>
+            <a:fillRef idx="0">
+              <a:schemeClr val="accent1"/>
+            </a:fillRef>
+            <a:effectRef idx="1">
+              <a:schemeClr val="accent1"/>
+            </a:effectRef>
+            <a:fontRef idx="minor">
+              <a:schemeClr val="tx1"/>
+            </a:fontRef>
+          </p:style>
+        </p:cxnSp>
+        <p:cxnSp>
+          <p:nvCxnSpPr>
+            <p:cNvPr id="28" name="Straight Connector 27"/>
+            <p:cNvCxnSpPr/>
+            <p:nvPr/>
+          </p:nvCxnSpPr>
+          <p:spPr>
+            <a:xfrm flipH="1">
+              <a:off x="5560391" y="3369152"/>
+              <a:ext cx="193622" cy="152400"/>
+            </a:xfrm>
+            <a:prstGeom prst="line">
+              <a:avLst/>
+            </a:prstGeom>
+            <a:ln>
+              <a:solidFill>
+                <a:srgbClr val="000000"/>
+              </a:solidFill>
+            </a:ln>
+          </p:spPr>
+          <p:style>
+            <a:lnRef idx="2">
+              <a:schemeClr val="accent1"/>
+            </a:lnRef>
+            <a:fillRef idx="0">
+              <a:schemeClr val="accent1"/>
+            </a:fillRef>
+            <a:effectRef idx="1">
+              <a:schemeClr val="accent1"/>
+            </a:effectRef>
+            <a:fontRef idx="minor">
+              <a:schemeClr val="tx1"/>
+            </a:fontRef>
+          </p:style>
+        </p:cxnSp>
+        <p:cxnSp>
+          <p:nvCxnSpPr>
+            <p:cNvPr id="29" name="Straight Connector 28"/>
+            <p:cNvCxnSpPr/>
+            <p:nvPr/>
+          </p:nvCxnSpPr>
+          <p:spPr>
+            <a:xfrm flipH="1" flipV="1">
+              <a:off x="5755991" y="3383312"/>
+              <a:ext cx="193622" cy="152400"/>
+            </a:xfrm>
+            <a:prstGeom prst="line">
+              <a:avLst/>
+            </a:prstGeom>
+            <a:ln>
+              <a:solidFill>
+                <a:srgbClr val="000000"/>
+              </a:solidFill>
+            </a:ln>
+          </p:spPr>
+          <p:style>
+            <a:lnRef idx="2">
+              <a:schemeClr val="accent1"/>
+            </a:lnRef>
+            <a:fillRef idx="0">
+              <a:schemeClr val="accent1"/>
+            </a:fillRef>
+            <a:effectRef idx="1">
+              <a:schemeClr val="accent1"/>
+            </a:effectRef>
+            <a:fontRef idx="minor">
+              <a:schemeClr val="tx1"/>
+            </a:fontRef>
+          </p:style>
+        </p:cxnSp>
+        <p:cxnSp>
+          <p:nvCxnSpPr>
+            <p:cNvPr id="30" name="Straight Connector 29"/>
+            <p:cNvCxnSpPr/>
+            <p:nvPr/>
+          </p:nvCxnSpPr>
+          <p:spPr>
+            <a:xfrm flipH="1" flipV="1">
+              <a:off x="5757066" y="3006497"/>
+              <a:ext cx="193622" cy="152400"/>
+            </a:xfrm>
+            <a:prstGeom prst="line">
+              <a:avLst/>
+            </a:prstGeom>
+            <a:ln>
+              <a:solidFill>
+                <a:srgbClr val="000000"/>
+              </a:solidFill>
+            </a:ln>
+          </p:spPr>
+          <p:style>
+            <a:lnRef idx="2">
+              <a:schemeClr val="accent1"/>
+            </a:lnRef>
+            <a:fillRef idx="0">
+              <a:schemeClr val="accent1"/>
+            </a:fillRef>
+            <a:effectRef idx="1">
+              <a:schemeClr val="accent1"/>
+            </a:effectRef>
+            <a:fontRef idx="minor">
+              <a:schemeClr val="tx1"/>
+            </a:fontRef>
+          </p:style>
+        </p:cxnSp>
+      </p:grpSp>
+      <p:grpSp>
+        <p:nvGrpSpPr>
+          <p:cNvPr id="32" name="Group 31"/>
+          <p:cNvGrpSpPr/>
+          <p:nvPr/>
+        </p:nvGrpSpPr>
+        <p:grpSpPr>
+          <a:xfrm>
+            <a:off x="2510760" y="4090608"/>
+            <a:ext cx="193622" cy="526673"/>
+            <a:chOff x="5552826" y="2385007"/>
+            <a:chExt cx="397862" cy="1150705"/>
+          </a:xfrm>
+        </p:grpSpPr>
+        <p:sp>
+          <p:nvSpPr>
+            <p:cNvPr id="33" name="Oval 32"/>
+            <p:cNvSpPr/>
+            <p:nvPr/>
+          </p:nvSpPr>
+          <p:spPr>
+            <a:xfrm>
+              <a:off x="5552826" y="2385007"/>
+              <a:ext cx="387244" cy="388433"/>
+            </a:xfrm>
+            <a:prstGeom prst="ellipse">
+              <a:avLst/>
+            </a:prstGeom>
+            <a:noFill/>
+            <a:ln w="19050" cmpd="sng">
+              <a:solidFill>
+                <a:schemeClr val="tx1"/>
+              </a:solidFill>
+            </a:ln>
+          </p:spPr>
+          <p:style>
+            <a:lnRef idx="1">
+              <a:schemeClr val="accent1"/>
+            </a:lnRef>
+            <a:fillRef idx="3">
+              <a:schemeClr val="accent1"/>
+            </a:fillRef>
+            <a:effectRef idx="2">
+              <a:schemeClr val="accent1"/>
+            </a:effectRef>
+            <a:fontRef idx="minor">
+              <a:schemeClr val="lt1"/>
+            </a:fontRef>
+          </p:style>
+          <p:txBody>
+            <a:bodyPr rtlCol="0" anchor="ctr"/>
+            <a:lstStyle/>
+            <a:p>
+              <a:pPr algn="ctr"/>
+              <a:endParaRPr lang="en-US"/>
+            </a:p>
+          </p:txBody>
+        </p:sp>
+        <p:cxnSp>
+          <p:nvCxnSpPr>
+            <p:cNvPr id="34" name="Straight Connector 33"/>
+            <p:cNvCxnSpPr>
+              <a:stCxn id="33" idx="4"/>
+            </p:cNvCxnSpPr>
+            <p:nvPr/>
+          </p:nvCxnSpPr>
+          <p:spPr>
+            <a:xfrm>
+              <a:off x="5746448" y="2773440"/>
+              <a:ext cx="7565" cy="595712"/>
+            </a:xfrm>
+            <a:prstGeom prst="line">
+              <a:avLst/>
+            </a:prstGeom>
+            <a:ln>
+              <a:solidFill>
+                <a:srgbClr val="000000"/>
+              </a:solidFill>
+            </a:ln>
+          </p:spPr>
+          <p:style>
+            <a:lnRef idx="2">
+              <a:schemeClr val="accent1"/>
+            </a:lnRef>
+            <a:fillRef idx="0">
+              <a:schemeClr val="accent1"/>
+            </a:fillRef>
+            <a:effectRef idx="1">
+              <a:schemeClr val="accent1"/>
+            </a:effectRef>
+            <a:fontRef idx="minor">
+              <a:schemeClr val="tx1"/>
+            </a:fontRef>
+          </p:style>
+        </p:cxnSp>
+        <p:cxnSp>
+          <p:nvCxnSpPr>
+            <p:cNvPr id="35" name="Straight Connector 34"/>
+            <p:cNvCxnSpPr/>
+            <p:nvPr/>
+          </p:nvCxnSpPr>
+          <p:spPr>
+            <a:xfrm flipH="1">
+              <a:off x="5552826" y="2992337"/>
+              <a:ext cx="193622" cy="152400"/>
+            </a:xfrm>
+            <a:prstGeom prst="line">
+              <a:avLst/>
+            </a:prstGeom>
+            <a:ln>
+              <a:solidFill>
+                <a:srgbClr val="000000"/>
+              </a:solidFill>
+            </a:ln>
+          </p:spPr>
+          <p:style>
+            <a:lnRef idx="2">
+              <a:schemeClr val="accent1"/>
+            </a:lnRef>
+            <a:fillRef idx="0">
+              <a:schemeClr val="accent1"/>
+            </a:fillRef>
+            <a:effectRef idx="1">
+              <a:schemeClr val="accent1"/>
+            </a:effectRef>
+            <a:fontRef idx="minor">
+              <a:schemeClr val="tx1"/>
+            </a:fontRef>
+          </p:style>
+        </p:cxnSp>
+        <p:cxnSp>
+          <p:nvCxnSpPr>
+            <p:cNvPr id="36" name="Straight Connector 35"/>
+            <p:cNvCxnSpPr/>
+            <p:nvPr/>
+          </p:nvCxnSpPr>
+          <p:spPr>
+            <a:xfrm flipH="1">
+              <a:off x="5560391" y="3369152"/>
+              <a:ext cx="193622" cy="152400"/>
+            </a:xfrm>
+            <a:prstGeom prst="line">
+              <a:avLst/>
+            </a:prstGeom>
+            <a:ln>
+              <a:solidFill>
+                <a:srgbClr val="000000"/>
+              </a:solidFill>
+            </a:ln>
+          </p:spPr>
+          <p:style>
+            <a:lnRef idx="2">
+              <a:schemeClr val="accent1"/>
+            </a:lnRef>
+            <a:fillRef idx="0">
+              <a:schemeClr val="accent1"/>
+            </a:fillRef>
+            <a:effectRef idx="1">
+              <a:schemeClr val="accent1"/>
+            </a:effectRef>
+            <a:fontRef idx="minor">
+              <a:schemeClr val="tx1"/>
+            </a:fontRef>
+          </p:style>
+        </p:cxnSp>
+        <p:cxnSp>
+          <p:nvCxnSpPr>
+            <p:cNvPr id="37" name="Straight Connector 36"/>
+            <p:cNvCxnSpPr/>
+            <p:nvPr/>
+          </p:nvCxnSpPr>
+          <p:spPr>
+            <a:xfrm flipH="1" flipV="1">
+              <a:off x="5755991" y="3383312"/>
+              <a:ext cx="193622" cy="152400"/>
+            </a:xfrm>
+            <a:prstGeom prst="line">
+              <a:avLst/>
+            </a:prstGeom>
+            <a:ln>
+              <a:solidFill>
+                <a:srgbClr val="000000"/>
+              </a:solidFill>
+            </a:ln>
+          </p:spPr>
+          <p:style>
+            <a:lnRef idx="2">
+              <a:schemeClr val="accent1"/>
+            </a:lnRef>
+            <a:fillRef idx="0">
+              <a:schemeClr val="accent1"/>
+            </a:fillRef>
+            <a:effectRef idx="1">
+              <a:schemeClr val="accent1"/>
+            </a:effectRef>
+            <a:fontRef idx="minor">
+              <a:schemeClr val="tx1"/>
+            </a:fontRef>
+          </p:style>
+        </p:cxnSp>
+        <p:cxnSp>
+          <p:nvCxnSpPr>
+            <p:cNvPr id="38" name="Straight Connector 37"/>
+            <p:cNvCxnSpPr/>
+            <p:nvPr/>
+          </p:nvCxnSpPr>
+          <p:spPr>
+            <a:xfrm flipH="1" flipV="1">
+              <a:off x="5757066" y="3006497"/>
+              <a:ext cx="193622" cy="152400"/>
+            </a:xfrm>
+            <a:prstGeom prst="line">
+              <a:avLst/>
+            </a:prstGeom>
+            <a:ln>
+              <a:solidFill>
+                <a:srgbClr val="000000"/>
+              </a:solidFill>
+            </a:ln>
+          </p:spPr>
+          <p:style>
+            <a:lnRef idx="2">
+              <a:schemeClr val="accent1"/>
+            </a:lnRef>
+            <a:fillRef idx="0">
+              <a:schemeClr val="accent1"/>
+            </a:fillRef>
+            <a:effectRef idx="1">
+              <a:schemeClr val="accent1"/>
+            </a:effectRef>
+            <a:fontRef idx="minor">
+              <a:schemeClr val="tx1"/>
+            </a:fontRef>
+          </p:style>
+        </p:cxnSp>
+      </p:grpSp>
+      <p:grpSp>
+        <p:nvGrpSpPr>
+          <p:cNvPr id="46" name="Group 45"/>
+          <p:cNvGrpSpPr/>
+          <p:nvPr/>
+        </p:nvGrpSpPr>
+        <p:grpSpPr>
+          <a:xfrm>
+            <a:off x="2695367" y="4086540"/>
+            <a:ext cx="193622" cy="526673"/>
+            <a:chOff x="5552826" y="2385007"/>
+            <a:chExt cx="397862" cy="1150705"/>
+          </a:xfrm>
+        </p:grpSpPr>
+        <p:sp>
+          <p:nvSpPr>
+            <p:cNvPr id="47" name="Oval 46"/>
+            <p:cNvSpPr/>
+            <p:nvPr/>
+          </p:nvSpPr>
+          <p:spPr>
+            <a:xfrm>
+              <a:off x="5552826" y="2385007"/>
+              <a:ext cx="387244" cy="388433"/>
+            </a:xfrm>
+            <a:prstGeom prst="ellipse">
+              <a:avLst/>
+            </a:prstGeom>
+            <a:noFill/>
+            <a:ln w="19050" cmpd="sng">
+              <a:solidFill>
+                <a:schemeClr val="tx1"/>
+              </a:solidFill>
+            </a:ln>
+          </p:spPr>
+          <p:style>
+            <a:lnRef idx="1">
+              <a:schemeClr val="accent1"/>
+            </a:lnRef>
+            <a:fillRef idx="3">
+              <a:schemeClr val="accent1"/>
+            </a:fillRef>
+            <a:effectRef idx="2">
+              <a:schemeClr val="accent1"/>
+            </a:effectRef>
+            <a:fontRef idx="minor">
+              <a:schemeClr val="lt1"/>
+            </a:fontRef>
+          </p:style>
+          <p:txBody>
+            <a:bodyPr rtlCol="0" anchor="ctr"/>
+            <a:lstStyle/>
+            <a:p>
+              <a:pPr algn="ctr"/>
+              <a:endParaRPr lang="en-US"/>
+            </a:p>
+          </p:txBody>
+        </p:sp>
+        <p:cxnSp>
+          <p:nvCxnSpPr>
+            <p:cNvPr id="48" name="Straight Connector 47"/>
+            <p:cNvCxnSpPr>
+              <a:stCxn id="47" idx="4"/>
+            </p:cNvCxnSpPr>
+            <p:nvPr/>
+          </p:nvCxnSpPr>
+          <p:spPr>
+            <a:xfrm>
+              <a:off x="5746448" y="2773440"/>
+              <a:ext cx="7565" cy="595712"/>
+            </a:xfrm>
+            <a:prstGeom prst="line">
+              <a:avLst/>
+            </a:prstGeom>
+            <a:ln>
+              <a:solidFill>
+                <a:srgbClr val="000000"/>
+              </a:solidFill>
+            </a:ln>
+          </p:spPr>
+          <p:style>
+            <a:lnRef idx="2">
+              <a:schemeClr val="accent1"/>
+            </a:lnRef>
+            <a:fillRef idx="0">
+              <a:schemeClr val="accent1"/>
+            </a:fillRef>
+            <a:effectRef idx="1">
+              <a:schemeClr val="accent1"/>
+            </a:effectRef>
+            <a:fontRef idx="minor">
+              <a:schemeClr val="tx1"/>
+            </a:fontRef>
+          </p:style>
+        </p:cxnSp>
+        <p:cxnSp>
+          <p:nvCxnSpPr>
+            <p:cNvPr id="49" name="Straight Connector 48"/>
+            <p:cNvCxnSpPr/>
+            <p:nvPr/>
+          </p:nvCxnSpPr>
+          <p:spPr>
+            <a:xfrm flipH="1">
+              <a:off x="5552826" y="2992337"/>
+              <a:ext cx="193622" cy="152400"/>
+            </a:xfrm>
+            <a:prstGeom prst="line">
+              <a:avLst/>
+            </a:prstGeom>
+            <a:ln>
+              <a:solidFill>
+                <a:srgbClr val="000000"/>
+              </a:solidFill>
+            </a:ln>
+          </p:spPr>
+          <p:style>
+            <a:lnRef idx="2">
+              <a:schemeClr val="accent1"/>
+            </a:lnRef>
+            <a:fillRef idx="0">
+              <a:schemeClr val="accent1"/>
+            </a:fillRef>
+            <a:effectRef idx="1">
+              <a:schemeClr val="accent1"/>
+            </a:effectRef>
+            <a:fontRef idx="minor">
+              <a:schemeClr val="tx1"/>
+            </a:fontRef>
+          </p:style>
+        </p:cxnSp>
+        <p:cxnSp>
+          <p:nvCxnSpPr>
+            <p:cNvPr id="50" name="Straight Connector 49"/>
+            <p:cNvCxnSpPr/>
+            <p:nvPr/>
+          </p:nvCxnSpPr>
+          <p:spPr>
+            <a:xfrm flipH="1">
+              <a:off x="5560391" y="3369152"/>
+              <a:ext cx="193622" cy="152400"/>
+            </a:xfrm>
+            <a:prstGeom prst="line">
+              <a:avLst/>
+            </a:prstGeom>
+            <a:ln>
+              <a:solidFill>
+                <a:srgbClr val="000000"/>
+              </a:solidFill>
+            </a:ln>
+          </p:spPr>
+          <p:style>
+            <a:lnRef idx="2">
+              <a:schemeClr val="accent1"/>
+            </a:lnRef>
+            <a:fillRef idx="0">
+              <a:schemeClr val="accent1"/>
+            </a:fillRef>
+            <a:effectRef idx="1">
+              <a:schemeClr val="accent1"/>
+            </a:effectRef>
+            <a:fontRef idx="minor">
+              <a:schemeClr val="tx1"/>
+            </a:fontRef>
+          </p:style>
+        </p:cxnSp>
+        <p:cxnSp>
+          <p:nvCxnSpPr>
+            <p:cNvPr id="51" name="Straight Connector 50"/>
+            <p:cNvCxnSpPr/>
+            <p:nvPr/>
+          </p:nvCxnSpPr>
+          <p:spPr>
+            <a:xfrm flipH="1" flipV="1">
+              <a:off x="5755991" y="3383312"/>
+              <a:ext cx="193622" cy="152400"/>
+            </a:xfrm>
+            <a:prstGeom prst="line">
+              <a:avLst/>
+            </a:prstGeom>
+            <a:ln>
+              <a:solidFill>
+                <a:srgbClr val="000000"/>
+              </a:solidFill>
+            </a:ln>
+          </p:spPr>
+          <p:style>
+            <a:lnRef idx="2">
+              <a:schemeClr val="accent1"/>
+            </a:lnRef>
+            <a:fillRef idx="0">
+              <a:schemeClr val="accent1"/>
+            </a:fillRef>
+            <a:effectRef idx="1">
+              <a:schemeClr val="accent1"/>
+            </a:effectRef>
+            <a:fontRef idx="minor">
+              <a:schemeClr val="tx1"/>
+            </a:fontRef>
+          </p:style>
+        </p:cxnSp>
+        <p:cxnSp>
+          <p:nvCxnSpPr>
+            <p:cNvPr id="52" name="Straight Connector 51"/>
+            <p:cNvCxnSpPr/>
+            <p:nvPr/>
+          </p:nvCxnSpPr>
+          <p:spPr>
+            <a:xfrm flipH="1" flipV="1">
+              <a:off x="5757066" y="3006497"/>
+              <a:ext cx="193622" cy="152400"/>
+            </a:xfrm>
+            <a:prstGeom prst="line">
+              <a:avLst/>
+            </a:prstGeom>
+            <a:ln>
+              <a:solidFill>
+                <a:srgbClr val="000000"/>
+              </a:solidFill>
+            </a:ln>
+          </p:spPr>
+          <p:style>
+            <a:lnRef idx="2">
+              <a:schemeClr val="accent1"/>
+            </a:lnRef>
+            <a:fillRef idx="0">
+              <a:schemeClr val="accent1"/>
+            </a:fillRef>
+            <a:effectRef idx="1">
+              <a:schemeClr val="accent1"/>
+            </a:effectRef>
+            <a:fontRef idx="minor">
+              <a:schemeClr val="tx1"/>
+            </a:fontRef>
+          </p:style>
+        </p:cxnSp>
+      </p:grpSp>
+      <p:grpSp>
+        <p:nvGrpSpPr>
+          <p:cNvPr id="53" name="Group 52"/>
+          <p:cNvGrpSpPr/>
+          <p:nvPr/>
+        </p:nvGrpSpPr>
+        <p:grpSpPr>
+          <a:xfrm>
+            <a:off x="2879974" y="4082472"/>
+            <a:ext cx="193622" cy="526673"/>
+            <a:chOff x="5552826" y="2385007"/>
+            <a:chExt cx="397862" cy="1150705"/>
+          </a:xfrm>
+        </p:grpSpPr>
+        <p:sp>
+          <p:nvSpPr>
+            <p:cNvPr id="54" name="Oval 53"/>
+            <p:cNvSpPr/>
+            <p:nvPr/>
+          </p:nvSpPr>
+          <p:spPr>
+            <a:xfrm>
+              <a:off x="5552826" y="2385007"/>
+              <a:ext cx="387244" cy="388433"/>
+            </a:xfrm>
+            <a:prstGeom prst="ellipse">
+              <a:avLst/>
+            </a:prstGeom>
+            <a:noFill/>
+            <a:ln w="19050" cmpd="sng">
+              <a:solidFill>
+                <a:schemeClr val="tx1"/>
+              </a:solidFill>
+            </a:ln>
+          </p:spPr>
+          <p:style>
+            <a:lnRef idx="1">
+              <a:schemeClr val="accent1"/>
+            </a:lnRef>
+            <a:fillRef idx="3">
+              <a:schemeClr val="accent1"/>
+            </a:fillRef>
+            <a:effectRef idx="2">
+              <a:schemeClr val="accent1"/>
+            </a:effectRef>
+            <a:fontRef idx="minor">
+              <a:schemeClr val="lt1"/>
+            </a:fontRef>
+          </p:style>
+          <p:txBody>
+            <a:bodyPr rtlCol="0" anchor="ctr"/>
+            <a:lstStyle/>
+            <a:p>
+              <a:pPr algn="ctr"/>
+              <a:endParaRPr lang="en-US"/>
+            </a:p>
+          </p:txBody>
+        </p:sp>
+        <p:cxnSp>
+          <p:nvCxnSpPr>
+            <p:cNvPr id="55" name="Straight Connector 54"/>
+            <p:cNvCxnSpPr>
+              <a:stCxn id="54" idx="4"/>
+            </p:cNvCxnSpPr>
+            <p:nvPr/>
+          </p:nvCxnSpPr>
+          <p:spPr>
+            <a:xfrm>
+              <a:off x="5746448" y="2773440"/>
+              <a:ext cx="7565" cy="595712"/>
+            </a:xfrm>
+            <a:prstGeom prst="line">
+              <a:avLst/>
+            </a:prstGeom>
+            <a:ln>
+              <a:solidFill>
+                <a:srgbClr val="000000"/>
+              </a:solidFill>
+            </a:ln>
+          </p:spPr>
+          <p:style>
+            <a:lnRef idx="2">
+              <a:schemeClr val="accent1"/>
+            </a:lnRef>
+            <a:fillRef idx="0">
+              <a:schemeClr val="accent1"/>
+            </a:fillRef>
+            <a:effectRef idx="1">
+              <a:schemeClr val="accent1"/>
+            </a:effectRef>
+            <a:fontRef idx="minor">
+              <a:schemeClr val="tx1"/>
+            </a:fontRef>
+          </p:style>
+        </p:cxnSp>
+        <p:cxnSp>
+          <p:nvCxnSpPr>
+            <p:cNvPr id="56" name="Straight Connector 55"/>
+            <p:cNvCxnSpPr/>
+            <p:nvPr/>
+          </p:nvCxnSpPr>
+          <p:spPr>
+            <a:xfrm flipH="1">
+              <a:off x="5552826" y="2992337"/>
+              <a:ext cx="193622" cy="152400"/>
+            </a:xfrm>
+            <a:prstGeom prst="line">
+              <a:avLst/>
+            </a:prstGeom>
+            <a:ln>
+              <a:solidFill>
+                <a:srgbClr val="000000"/>
+              </a:solidFill>
+            </a:ln>
+          </p:spPr>
+          <p:style>
+            <a:lnRef idx="2">
+              <a:schemeClr val="accent1"/>
+            </a:lnRef>
+            <a:fillRef idx="0">
+              <a:schemeClr val="accent1"/>
+            </a:fillRef>
+            <a:effectRef idx="1">
+              <a:schemeClr val="accent1"/>
+            </a:effectRef>
+            <a:fontRef idx="minor">
+              <a:schemeClr val="tx1"/>
+            </a:fontRef>
+          </p:style>
+        </p:cxnSp>
+        <p:cxnSp>
+          <p:nvCxnSpPr>
+            <p:cNvPr id="57" name="Straight Connector 56"/>
+            <p:cNvCxnSpPr/>
+            <p:nvPr/>
+          </p:nvCxnSpPr>
+          <p:spPr>
+            <a:xfrm flipH="1">
+              <a:off x="5560391" y="3369152"/>
+              <a:ext cx="193622" cy="152400"/>
+            </a:xfrm>
+            <a:prstGeom prst="line">
+              <a:avLst/>
+            </a:prstGeom>
+            <a:ln>
+              <a:solidFill>
+                <a:srgbClr val="000000"/>
+              </a:solidFill>
+            </a:ln>
+          </p:spPr>
+          <p:style>
+            <a:lnRef idx="2">
+              <a:schemeClr val="accent1"/>
+            </a:lnRef>
+            <a:fillRef idx="0">
+              <a:schemeClr val="accent1"/>
+            </a:fillRef>
+            <a:effectRef idx="1">
+              <a:schemeClr val="accent1"/>
+            </a:effectRef>
+            <a:fontRef idx="minor">
+              <a:schemeClr val="tx1"/>
+            </a:fontRef>
+          </p:style>
+        </p:cxnSp>
+        <p:cxnSp>
+          <p:nvCxnSpPr>
+            <p:cNvPr id="58" name="Straight Connector 57"/>
+            <p:cNvCxnSpPr/>
+            <p:nvPr/>
+          </p:nvCxnSpPr>
+          <p:spPr>
+            <a:xfrm flipH="1" flipV="1">
+              <a:off x="5755991" y="3383312"/>
+              <a:ext cx="193622" cy="152400"/>
+            </a:xfrm>
+            <a:prstGeom prst="line">
+              <a:avLst/>
+            </a:prstGeom>
+            <a:ln>
+              <a:solidFill>
+                <a:srgbClr val="000000"/>
+              </a:solidFill>
+            </a:ln>
+          </p:spPr>
+          <p:style>
+            <a:lnRef idx="2">
+              <a:schemeClr val="accent1"/>
+            </a:lnRef>
+            <a:fillRef idx="0">
+              <a:schemeClr val="accent1"/>
+            </a:fillRef>
+            <a:effectRef idx="1">
+              <a:schemeClr val="accent1"/>
+            </a:effectRef>
+            <a:fontRef idx="minor">
+              <a:schemeClr val="tx1"/>
+            </a:fontRef>
+          </p:style>
+        </p:cxnSp>
+        <p:cxnSp>
+          <p:nvCxnSpPr>
+            <p:cNvPr id="59" name="Straight Connector 58"/>
+            <p:cNvCxnSpPr/>
+            <p:nvPr/>
+          </p:nvCxnSpPr>
+          <p:spPr>
+            <a:xfrm flipH="1" flipV="1">
+              <a:off x="5757066" y="3006497"/>
+              <a:ext cx="193622" cy="152400"/>
+            </a:xfrm>
+            <a:prstGeom prst="line">
+              <a:avLst/>
+            </a:prstGeom>
+            <a:ln>
+              <a:solidFill>
+                <a:srgbClr val="000000"/>
+              </a:solidFill>
+            </a:ln>
+          </p:spPr>
+          <p:style>
+            <a:lnRef idx="2">
+              <a:schemeClr val="accent1"/>
+            </a:lnRef>
+            <a:fillRef idx="0">
+              <a:schemeClr val="accent1"/>
+            </a:fillRef>
+            <a:effectRef idx="1">
+              <a:schemeClr val="accent1"/>
+            </a:effectRef>
+            <a:fontRef idx="minor">
+              <a:schemeClr val="tx1"/>
+            </a:fontRef>
+          </p:style>
+        </p:cxnSp>
+      </p:grpSp>
+      <p:grpSp>
+        <p:nvGrpSpPr>
+          <p:cNvPr id="60" name="Group 59"/>
+          <p:cNvGrpSpPr/>
+          <p:nvPr/>
+        </p:nvGrpSpPr>
+        <p:grpSpPr>
+          <a:xfrm>
+            <a:off x="3064581" y="4078404"/>
+            <a:ext cx="193622" cy="526673"/>
+            <a:chOff x="5552826" y="2385007"/>
+            <a:chExt cx="397862" cy="1150705"/>
+          </a:xfrm>
+        </p:grpSpPr>
+        <p:sp>
+          <p:nvSpPr>
+            <p:cNvPr id="61" name="Oval 60"/>
+            <p:cNvSpPr/>
+            <p:nvPr/>
+          </p:nvSpPr>
+          <p:spPr>
+            <a:xfrm>
+              <a:off x="5552826" y="2385007"/>
+              <a:ext cx="387244" cy="388433"/>
+            </a:xfrm>
+            <a:prstGeom prst="ellipse">
+              <a:avLst/>
+            </a:prstGeom>
+            <a:noFill/>
+            <a:ln w="19050" cmpd="sng">
+              <a:solidFill>
+                <a:schemeClr val="tx1"/>
+              </a:solidFill>
+            </a:ln>
+          </p:spPr>
+          <p:style>
+            <a:lnRef idx="1">
+              <a:schemeClr val="accent1"/>
+            </a:lnRef>
+            <a:fillRef idx="3">
+              <a:schemeClr val="accent1"/>
+            </a:fillRef>
+            <a:effectRef idx="2">
+              <a:schemeClr val="accent1"/>
+            </a:effectRef>
+            <a:fontRef idx="minor">
+              <a:schemeClr val="lt1"/>
+            </a:fontRef>
+          </p:style>
+          <p:txBody>
+            <a:bodyPr rtlCol="0" anchor="ctr"/>
+            <a:lstStyle/>
+            <a:p>
+              <a:pPr algn="ctr"/>
+              <a:endParaRPr lang="en-US"/>
+            </a:p>
+          </p:txBody>
+        </p:sp>
+        <p:cxnSp>
+          <p:nvCxnSpPr>
+            <p:cNvPr id="62" name="Straight Connector 61"/>
+            <p:cNvCxnSpPr>
+              <a:stCxn id="61" idx="4"/>
+            </p:cNvCxnSpPr>
+            <p:nvPr/>
+          </p:nvCxnSpPr>
+          <p:spPr>
+            <a:xfrm>
+              <a:off x="5746448" y="2773440"/>
+              <a:ext cx="7565" cy="595712"/>
+            </a:xfrm>
+            <a:prstGeom prst="line">
+              <a:avLst/>
+            </a:prstGeom>
+            <a:ln>
+              <a:solidFill>
+                <a:srgbClr val="000000"/>
+              </a:solidFill>
+            </a:ln>
+          </p:spPr>
+          <p:style>
+            <a:lnRef idx="2">
+              <a:schemeClr val="accent1"/>
+            </a:lnRef>
+            <a:fillRef idx="0">
+              <a:schemeClr val="accent1"/>
+            </a:fillRef>
+            <a:effectRef idx="1">
+              <a:schemeClr val="accent1"/>
+            </a:effectRef>
+            <a:fontRef idx="minor">
+              <a:schemeClr val="tx1"/>
+            </a:fontRef>
+          </p:style>
+        </p:cxnSp>
+        <p:cxnSp>
+          <p:nvCxnSpPr>
+            <p:cNvPr id="63" name="Straight Connector 62"/>
+            <p:cNvCxnSpPr/>
+            <p:nvPr/>
+          </p:nvCxnSpPr>
+          <p:spPr>
+            <a:xfrm flipH="1">
+              <a:off x="5552826" y="2992337"/>
+              <a:ext cx="193622" cy="152400"/>
+            </a:xfrm>
+            <a:prstGeom prst="line">
+              <a:avLst/>
+            </a:prstGeom>
+            <a:ln>
+              <a:solidFill>
+                <a:srgbClr val="000000"/>
+              </a:solidFill>
+            </a:ln>
+          </p:spPr>
+          <p:style>
+            <a:lnRef idx="2">
+              <a:schemeClr val="accent1"/>
+            </a:lnRef>
+            <a:fillRef idx="0">
+              <a:schemeClr val="accent1"/>
+            </a:fillRef>
+            <a:effectRef idx="1">
+              <a:schemeClr val="accent1"/>
+            </a:effectRef>
+            <a:fontRef idx="minor">
+              <a:schemeClr val="tx1"/>
+            </a:fontRef>
+          </p:style>
+        </p:cxnSp>
+        <p:cxnSp>
+          <p:nvCxnSpPr>
+            <p:cNvPr id="64" name="Straight Connector 63"/>
+            <p:cNvCxnSpPr/>
+            <p:nvPr/>
+          </p:nvCxnSpPr>
+          <p:spPr>
+            <a:xfrm flipH="1">
+              <a:off x="5560391" y="3369152"/>
+              <a:ext cx="193622" cy="152400"/>
+            </a:xfrm>
+            <a:prstGeom prst="line">
+              <a:avLst/>
+            </a:prstGeom>
+            <a:ln>
+              <a:solidFill>
+                <a:srgbClr val="000000"/>
+              </a:solidFill>
+            </a:ln>
+          </p:spPr>
+          <p:style>
+            <a:lnRef idx="2">
+              <a:schemeClr val="accent1"/>
+            </a:lnRef>
+            <a:fillRef idx="0">
+              <a:schemeClr val="accent1"/>
+            </a:fillRef>
+            <a:effectRef idx="1">
+              <a:schemeClr val="accent1"/>
+            </a:effectRef>
+            <a:fontRef idx="minor">
+              <a:schemeClr val="tx1"/>
+            </a:fontRef>
+          </p:style>
+        </p:cxnSp>
+        <p:cxnSp>
+          <p:nvCxnSpPr>
+            <p:cNvPr id="65" name="Straight Connector 64"/>
+            <p:cNvCxnSpPr/>
+            <p:nvPr/>
+          </p:nvCxnSpPr>
+          <p:spPr>
+            <a:xfrm flipH="1" flipV="1">
+              <a:off x="5755991" y="3383312"/>
+              <a:ext cx="193622" cy="152400"/>
+            </a:xfrm>
+            <a:prstGeom prst="line">
+              <a:avLst/>
+            </a:prstGeom>
+            <a:ln>
+              <a:solidFill>
+                <a:srgbClr val="000000"/>
+              </a:solidFill>
+            </a:ln>
+          </p:spPr>
+          <p:style>
+            <a:lnRef idx="2">
+              <a:schemeClr val="accent1"/>
+            </a:lnRef>
+            <a:fillRef idx="0">
+              <a:schemeClr val="accent1"/>
+            </a:fillRef>
+            <a:effectRef idx="1">
+              <a:schemeClr val="accent1"/>
+            </a:effectRef>
+            <a:fontRef idx="minor">
+              <a:schemeClr val="tx1"/>
+            </a:fontRef>
+          </p:style>
+        </p:cxnSp>
+        <p:cxnSp>
+          <p:nvCxnSpPr>
+            <p:cNvPr id="66" name="Straight Connector 65"/>
+            <p:cNvCxnSpPr/>
+            <p:nvPr/>
+          </p:nvCxnSpPr>
+          <p:spPr>
+            <a:xfrm flipH="1" flipV="1">
+              <a:off x="5757066" y="3006497"/>
+              <a:ext cx="193622" cy="152400"/>
+            </a:xfrm>
+            <a:prstGeom prst="line">
+              <a:avLst/>
+            </a:prstGeom>
+            <a:ln>
+              <a:solidFill>
+                <a:srgbClr val="000000"/>
+              </a:solidFill>
+            </a:ln>
+          </p:spPr>
+          <p:style>
+            <a:lnRef idx="2">
+              <a:schemeClr val="accent1"/>
+            </a:lnRef>
+            <a:fillRef idx="0">
+              <a:schemeClr val="accent1"/>
+            </a:fillRef>
+            <a:effectRef idx="1">
+              <a:schemeClr val="accent1"/>
+            </a:effectRef>
+            <a:fontRef idx="minor">
+              <a:schemeClr val="tx1"/>
+            </a:fontRef>
+          </p:style>
+        </p:cxnSp>
+      </p:grpSp>
+      <p:grpSp>
+        <p:nvGrpSpPr>
+          <p:cNvPr id="67" name="Group 66"/>
+          <p:cNvGrpSpPr/>
+          <p:nvPr/>
+        </p:nvGrpSpPr>
+        <p:grpSpPr>
+          <a:xfrm>
+            <a:off x="2868002" y="922219"/>
+            <a:ext cx="193622" cy="526673"/>
+            <a:chOff x="5552826" y="2385007"/>
+            <a:chExt cx="397862" cy="1150705"/>
+          </a:xfrm>
+        </p:grpSpPr>
+        <p:sp>
+          <p:nvSpPr>
+            <p:cNvPr id="68" name="Oval 67"/>
+            <p:cNvSpPr/>
+            <p:nvPr/>
+          </p:nvSpPr>
+          <p:spPr>
+            <a:xfrm>
+              <a:off x="5552826" y="2385007"/>
+              <a:ext cx="387244" cy="388433"/>
+            </a:xfrm>
+            <a:prstGeom prst="ellipse">
+              <a:avLst/>
+            </a:prstGeom>
+            <a:noFill/>
+            <a:ln w="19050" cmpd="sng">
+              <a:solidFill>
+                <a:schemeClr val="tx1"/>
+              </a:solidFill>
+            </a:ln>
+          </p:spPr>
+          <p:style>
+            <a:lnRef idx="1">
+              <a:schemeClr val="accent1"/>
+            </a:lnRef>
+            <a:fillRef idx="3">
+              <a:schemeClr val="accent1"/>
+            </a:fillRef>
+            <a:effectRef idx="2">
+              <a:schemeClr val="accent1"/>
+            </a:effectRef>
+            <a:fontRef idx="minor">
+              <a:schemeClr val="lt1"/>
+            </a:fontRef>
+          </p:style>
+          <p:txBody>
+            <a:bodyPr rtlCol="0" anchor="ctr"/>
+            <a:lstStyle/>
+            <a:p>
+              <a:pPr algn="ctr"/>
+              <a:endParaRPr lang="en-US"/>
+            </a:p>
+          </p:txBody>
+        </p:sp>
+        <p:cxnSp>
+          <p:nvCxnSpPr>
+            <p:cNvPr id="69" name="Straight Connector 68"/>
+            <p:cNvCxnSpPr>
+              <a:stCxn id="68" idx="4"/>
+            </p:cNvCxnSpPr>
+            <p:nvPr/>
+          </p:nvCxnSpPr>
+          <p:spPr>
+            <a:xfrm>
+              <a:off x="5746448" y="2773440"/>
+              <a:ext cx="7565" cy="595712"/>
+            </a:xfrm>
+            <a:prstGeom prst="line">
+              <a:avLst/>
+            </a:prstGeom>
+            <a:ln>
+              <a:solidFill>
+                <a:srgbClr val="000000"/>
+              </a:solidFill>
+            </a:ln>
+          </p:spPr>
+          <p:style>
+            <a:lnRef idx="2">
+              <a:schemeClr val="accent1"/>
+            </a:lnRef>
+            <a:fillRef idx="0">
+              <a:schemeClr val="accent1"/>
+            </a:fillRef>
+            <a:effectRef idx="1">
+              <a:schemeClr val="accent1"/>
+            </a:effectRef>
+            <a:fontRef idx="minor">
+              <a:schemeClr val="tx1"/>
+            </a:fontRef>
+          </p:style>
+        </p:cxnSp>
+        <p:cxnSp>
+          <p:nvCxnSpPr>
+            <p:cNvPr id="70" name="Straight Connector 69"/>
+            <p:cNvCxnSpPr/>
+            <p:nvPr/>
+          </p:nvCxnSpPr>
+          <p:spPr>
+            <a:xfrm flipH="1">
+              <a:off x="5552826" y="2992337"/>
+              <a:ext cx="193622" cy="152400"/>
+            </a:xfrm>
+            <a:prstGeom prst="line">
+              <a:avLst/>
+            </a:prstGeom>
+            <a:ln>
+              <a:solidFill>
+                <a:srgbClr val="000000"/>
+              </a:solidFill>
+            </a:ln>
+          </p:spPr>
+          <p:style>
+            <a:lnRef idx="2">
+              <a:schemeClr val="accent1"/>
+            </a:lnRef>
+            <a:fillRef idx="0">
+              <a:schemeClr val="accent1"/>
+            </a:fillRef>
+            <a:effectRef idx="1">
+              <a:schemeClr val="accent1"/>
+            </a:effectRef>
+            <a:fontRef idx="minor">
+              <a:schemeClr val="tx1"/>
+            </a:fontRef>
+          </p:style>
+        </p:cxnSp>
+        <p:cxnSp>
+          <p:nvCxnSpPr>
+            <p:cNvPr id="71" name="Straight Connector 70"/>
+            <p:cNvCxnSpPr/>
+            <p:nvPr/>
+          </p:nvCxnSpPr>
+          <p:spPr>
+            <a:xfrm flipH="1">
+              <a:off x="5560391" y="3369152"/>
+              <a:ext cx="193622" cy="152400"/>
+            </a:xfrm>
+            <a:prstGeom prst="line">
+              <a:avLst/>
+            </a:prstGeom>
+            <a:ln>
+              <a:solidFill>
+                <a:srgbClr val="000000"/>
+              </a:solidFill>
+            </a:ln>
+          </p:spPr>
+          <p:style>
+            <a:lnRef idx="2">
+              <a:schemeClr val="accent1"/>
+            </a:lnRef>
+            <a:fillRef idx="0">
+              <a:schemeClr val="accent1"/>
+            </a:fillRef>
+            <a:effectRef idx="1">
+              <a:schemeClr val="accent1"/>
+            </a:effectRef>
+            <a:fontRef idx="minor">
+              <a:schemeClr val="tx1"/>
+            </a:fontRef>
+          </p:style>
+        </p:cxnSp>
+        <p:cxnSp>
+          <p:nvCxnSpPr>
+            <p:cNvPr id="72" name="Straight Connector 71"/>
+            <p:cNvCxnSpPr/>
+            <p:nvPr/>
+          </p:nvCxnSpPr>
+          <p:spPr>
+            <a:xfrm flipH="1" flipV="1">
+              <a:off x="5755991" y="3383312"/>
+              <a:ext cx="193622" cy="152400"/>
+            </a:xfrm>
+            <a:prstGeom prst="line">
+              <a:avLst/>
+            </a:prstGeom>
+            <a:ln>
+              <a:solidFill>
+                <a:srgbClr val="000000"/>
+              </a:solidFill>
+            </a:ln>
+          </p:spPr>
+          <p:style>
+            <a:lnRef idx="2">
+              <a:schemeClr val="accent1"/>
+            </a:lnRef>
+            <a:fillRef idx="0">
+              <a:schemeClr val="accent1"/>
+            </a:fillRef>
+            <a:effectRef idx="1">
+              <a:schemeClr val="accent1"/>
+            </a:effectRef>
+            <a:fontRef idx="minor">
+              <a:schemeClr val="tx1"/>
+            </a:fontRef>
+          </p:style>
+        </p:cxnSp>
+        <p:cxnSp>
+          <p:nvCxnSpPr>
+            <p:cNvPr id="73" name="Straight Connector 72"/>
+            <p:cNvCxnSpPr/>
+            <p:nvPr/>
+          </p:nvCxnSpPr>
+          <p:spPr>
+            <a:xfrm flipH="1" flipV="1">
+              <a:off x="5757066" y="3006497"/>
+              <a:ext cx="193622" cy="152400"/>
+            </a:xfrm>
+            <a:prstGeom prst="line">
+              <a:avLst/>
+            </a:prstGeom>
+            <a:ln>
+              <a:solidFill>
+                <a:srgbClr val="000000"/>
+              </a:solidFill>
+            </a:ln>
+          </p:spPr>
+          <p:style>
+            <a:lnRef idx="2">
+              <a:schemeClr val="accent1"/>
+            </a:lnRef>
+            <a:fillRef idx="0">
+              <a:schemeClr val="accent1"/>
+            </a:fillRef>
+            <a:effectRef idx="1">
+              <a:schemeClr val="accent1"/>
+            </a:effectRef>
+            <a:fontRef idx="minor">
+              <a:schemeClr val="tx1"/>
+            </a:fontRef>
+          </p:style>
+        </p:cxnSp>
+      </p:grpSp>
+      <p:grpSp>
+        <p:nvGrpSpPr>
+          <p:cNvPr id="74" name="Group 73"/>
+          <p:cNvGrpSpPr/>
+          <p:nvPr/>
+        </p:nvGrpSpPr>
+        <p:grpSpPr>
+          <a:xfrm>
+            <a:off x="6918478" y="943335"/>
+            <a:ext cx="193622" cy="526673"/>
+            <a:chOff x="5552826" y="2385007"/>
+            <a:chExt cx="397862" cy="1150705"/>
+          </a:xfrm>
+        </p:grpSpPr>
+        <p:sp>
+          <p:nvSpPr>
+            <p:cNvPr id="75" name="Oval 74"/>
+            <p:cNvSpPr/>
+            <p:nvPr/>
+          </p:nvSpPr>
+          <p:spPr>
+            <a:xfrm>
+              <a:off x="5552826" y="2385007"/>
+              <a:ext cx="387244" cy="388433"/>
+            </a:xfrm>
+            <a:prstGeom prst="ellipse">
+              <a:avLst/>
+            </a:prstGeom>
+            <a:noFill/>
+            <a:ln w="19050" cmpd="sng">
+              <a:solidFill>
+                <a:schemeClr val="tx1"/>
+              </a:solidFill>
+            </a:ln>
+          </p:spPr>
+          <p:style>
+            <a:lnRef idx="1">
+              <a:schemeClr val="accent1"/>
+            </a:lnRef>
+            <a:fillRef idx="3">
+              <a:schemeClr val="accent1"/>
+            </a:fillRef>
+            <a:effectRef idx="2">
+              <a:schemeClr val="accent1"/>
+            </a:effectRef>
+            <a:fontRef idx="minor">
+              <a:schemeClr val="lt1"/>
+            </a:fontRef>
+          </p:style>
+          <p:txBody>
+            <a:bodyPr rtlCol="0" anchor="ctr"/>
+            <a:lstStyle/>
+            <a:p>
+              <a:pPr algn="ctr"/>
+              <a:endParaRPr lang="en-US"/>
+            </a:p>
+          </p:txBody>
+        </p:sp>
+        <p:cxnSp>
+          <p:nvCxnSpPr>
+            <p:cNvPr id="76" name="Straight Connector 75"/>
+            <p:cNvCxnSpPr>
+              <a:stCxn id="75" idx="4"/>
+            </p:cNvCxnSpPr>
+            <p:nvPr/>
+          </p:nvCxnSpPr>
+          <p:spPr>
+            <a:xfrm>
+              <a:off x="5746448" y="2773440"/>
+              <a:ext cx="7565" cy="595712"/>
+            </a:xfrm>
+            <a:prstGeom prst="line">
+              <a:avLst/>
+            </a:prstGeom>
+            <a:ln>
+              <a:solidFill>
+                <a:srgbClr val="000000"/>
+              </a:solidFill>
+            </a:ln>
+          </p:spPr>
+          <p:style>
+            <a:lnRef idx="2">
+              <a:schemeClr val="accent1"/>
+            </a:lnRef>
+            <a:fillRef idx="0">
+              <a:schemeClr val="accent1"/>
+            </a:fillRef>
+            <a:effectRef idx="1">
+              <a:schemeClr val="accent1"/>
+            </a:effectRef>
+            <a:fontRef idx="minor">
+              <a:schemeClr val="tx1"/>
+            </a:fontRef>
+          </p:style>
+        </p:cxnSp>
+        <p:cxnSp>
+          <p:nvCxnSpPr>
+            <p:cNvPr id="77" name="Straight Connector 76"/>
+            <p:cNvCxnSpPr/>
+            <p:nvPr/>
+          </p:nvCxnSpPr>
+          <p:spPr>
+            <a:xfrm flipH="1">
+              <a:off x="5552826" y="2992337"/>
+              <a:ext cx="193622" cy="152400"/>
+            </a:xfrm>
+            <a:prstGeom prst="line">
+              <a:avLst/>
+            </a:prstGeom>
+            <a:ln>
+              <a:solidFill>
+                <a:srgbClr val="000000"/>
+              </a:solidFill>
+            </a:ln>
+          </p:spPr>
+          <p:style>
+            <a:lnRef idx="2">
+              <a:schemeClr val="accent1"/>
+            </a:lnRef>
+            <a:fillRef idx="0">
+              <a:schemeClr val="accent1"/>
+            </a:fillRef>
+            <a:effectRef idx="1">
+              <a:schemeClr val="accent1"/>
+            </a:effectRef>
+            <a:fontRef idx="minor">
+              <a:schemeClr val="tx1"/>
+            </a:fontRef>
+          </p:style>
+        </p:cxnSp>
+        <p:cxnSp>
+          <p:nvCxnSpPr>
+            <p:cNvPr id="78" name="Straight Connector 77"/>
+            <p:cNvCxnSpPr/>
+            <p:nvPr/>
+          </p:nvCxnSpPr>
+          <p:spPr>
+            <a:xfrm flipH="1">
+              <a:off x="5560391" y="3369152"/>
+              <a:ext cx="193622" cy="152400"/>
+            </a:xfrm>
+            <a:prstGeom prst="line">
+              <a:avLst/>
+            </a:prstGeom>
+            <a:ln>
+              <a:solidFill>
+                <a:srgbClr val="000000"/>
+              </a:solidFill>
+            </a:ln>
+          </p:spPr>
+          <p:style>
+            <a:lnRef idx="2">
+              <a:schemeClr val="accent1"/>
+            </a:lnRef>
+            <a:fillRef idx="0">
+              <a:schemeClr val="accent1"/>
+            </a:fillRef>
+            <a:effectRef idx="1">
+              <a:schemeClr val="accent1"/>
+            </a:effectRef>
+            <a:fontRef idx="minor">
+              <a:schemeClr val="tx1"/>
+            </a:fontRef>
+          </p:style>
+        </p:cxnSp>
+        <p:cxnSp>
+          <p:nvCxnSpPr>
+            <p:cNvPr id="79" name="Straight Connector 78"/>
+            <p:cNvCxnSpPr/>
+            <p:nvPr/>
+          </p:nvCxnSpPr>
+          <p:spPr>
+            <a:xfrm flipH="1" flipV="1">
+              <a:off x="5755991" y="3383312"/>
+              <a:ext cx="193622" cy="152400"/>
+            </a:xfrm>
+            <a:prstGeom prst="line">
+              <a:avLst/>
+            </a:prstGeom>
+            <a:ln>
+              <a:solidFill>
+                <a:srgbClr val="000000"/>
+              </a:solidFill>
+            </a:ln>
+          </p:spPr>
+          <p:style>
+            <a:lnRef idx="2">
+              <a:schemeClr val="accent1"/>
+            </a:lnRef>
+            <a:fillRef idx="0">
+              <a:schemeClr val="accent1"/>
+            </a:fillRef>
+            <a:effectRef idx="1">
+              <a:schemeClr val="accent1"/>
+            </a:effectRef>
+            <a:fontRef idx="minor">
+              <a:schemeClr val="tx1"/>
+            </a:fontRef>
+          </p:style>
+        </p:cxnSp>
+        <p:cxnSp>
+          <p:nvCxnSpPr>
+            <p:cNvPr id="80" name="Straight Connector 79"/>
+            <p:cNvCxnSpPr/>
+            <p:nvPr/>
+          </p:nvCxnSpPr>
+          <p:spPr>
+            <a:xfrm flipH="1" flipV="1">
+              <a:off x="5757066" y="3006497"/>
+              <a:ext cx="193622" cy="152400"/>
+            </a:xfrm>
+            <a:prstGeom prst="line">
+              <a:avLst/>
+            </a:prstGeom>
+            <a:ln>
+              <a:solidFill>
+                <a:srgbClr val="000000"/>
+              </a:solidFill>
+            </a:ln>
+          </p:spPr>
+          <p:style>
+            <a:lnRef idx="2">
+              <a:schemeClr val="accent1"/>
+            </a:lnRef>
+            <a:fillRef idx="0">
+              <a:schemeClr val="accent1"/>
+            </a:fillRef>
+            <a:effectRef idx="1">
+              <a:schemeClr val="accent1"/>
+            </a:effectRef>
+            <a:fontRef idx="minor">
+              <a:schemeClr val="tx1"/>
+            </a:fontRef>
+          </p:style>
+        </p:cxnSp>
+      </p:grpSp>
+      <p:grpSp>
+        <p:nvGrpSpPr>
+          <p:cNvPr id="81" name="Group 80"/>
+          <p:cNvGrpSpPr/>
+          <p:nvPr/>
+        </p:nvGrpSpPr>
+        <p:grpSpPr>
+          <a:xfrm>
+            <a:off x="6319703" y="2025899"/>
+            <a:ext cx="193622" cy="526673"/>
+            <a:chOff x="5552826" y="2385007"/>
+            <a:chExt cx="397862" cy="1150705"/>
+          </a:xfrm>
+        </p:grpSpPr>
+        <p:sp>
+          <p:nvSpPr>
+            <p:cNvPr id="82" name="Oval 81"/>
+            <p:cNvSpPr/>
+            <p:nvPr/>
+          </p:nvSpPr>
+          <p:spPr>
+            <a:xfrm>
+              <a:off x="5552826" y="2385007"/>
+              <a:ext cx="387244" cy="388433"/>
+            </a:xfrm>
+            <a:prstGeom prst="ellipse">
+              <a:avLst/>
+            </a:prstGeom>
+            <a:noFill/>
+            <a:ln w="19050" cmpd="sng">
+              <a:solidFill>
+                <a:schemeClr val="tx1"/>
+              </a:solidFill>
+            </a:ln>
+          </p:spPr>
+          <p:style>
+            <a:lnRef idx="1">
+              <a:schemeClr val="accent1"/>
+            </a:lnRef>
+            <a:fillRef idx="3">
+              <a:schemeClr val="accent1"/>
+            </a:fillRef>
+            <a:effectRef idx="2">
+              <a:schemeClr val="accent1"/>
+            </a:effectRef>
+            <a:fontRef idx="minor">
+              <a:schemeClr val="lt1"/>
+            </a:fontRef>
+          </p:style>
+          <p:txBody>
+            <a:bodyPr rtlCol="0" anchor="ctr"/>
+            <a:lstStyle/>
+            <a:p>
+              <a:pPr algn="ctr"/>
+              <a:endParaRPr lang="en-US"/>
+            </a:p>
+          </p:txBody>
+        </p:sp>
+        <p:cxnSp>
+          <p:nvCxnSpPr>
+            <p:cNvPr id="83" name="Straight Connector 82"/>
+            <p:cNvCxnSpPr>
+              <a:stCxn id="82" idx="4"/>
+            </p:cNvCxnSpPr>
+            <p:nvPr/>
+          </p:nvCxnSpPr>
+          <p:spPr>
+            <a:xfrm>
+              <a:off x="5746448" y="2773440"/>
+              <a:ext cx="7565" cy="595712"/>
+            </a:xfrm>
+            <a:prstGeom prst="line">
+              <a:avLst/>
+            </a:prstGeom>
+            <a:ln>
+              <a:solidFill>
+                <a:srgbClr val="000000"/>
+              </a:solidFill>
+            </a:ln>
+          </p:spPr>
+          <p:style>
+            <a:lnRef idx="2">
+              <a:schemeClr val="accent1"/>
+            </a:lnRef>
+            <a:fillRef idx="0">
+              <a:schemeClr val="accent1"/>
+            </a:fillRef>
+            <a:effectRef idx="1">
+              <a:schemeClr val="accent1"/>
+            </a:effectRef>
+            <a:fontRef idx="minor">
+              <a:schemeClr val="tx1"/>
+            </a:fontRef>
+          </p:style>
+        </p:cxnSp>
+        <p:cxnSp>
+          <p:nvCxnSpPr>
+            <p:cNvPr id="84" name="Straight Connector 83"/>
+            <p:cNvCxnSpPr/>
+            <p:nvPr/>
+          </p:nvCxnSpPr>
+          <p:spPr>
+            <a:xfrm flipH="1">
+              <a:off x="5552826" y="2992337"/>
+              <a:ext cx="193622" cy="152400"/>
+            </a:xfrm>
+            <a:prstGeom prst="line">
+              <a:avLst/>
+            </a:prstGeom>
+            <a:ln>
+              <a:solidFill>
+                <a:srgbClr val="000000"/>
+              </a:solidFill>
+            </a:ln>
+          </p:spPr>
+          <p:style>
+            <a:lnRef idx="2">
+              <a:schemeClr val="accent1"/>
+            </a:lnRef>
+            <a:fillRef idx="0">
+              <a:schemeClr val="accent1"/>
+            </a:fillRef>
+            <a:effectRef idx="1">
+              <a:schemeClr val="accent1"/>
+            </a:effectRef>
+            <a:fontRef idx="minor">
+              <a:schemeClr val="tx1"/>
+            </a:fontRef>
+          </p:style>
+        </p:cxnSp>
+        <p:cxnSp>
+          <p:nvCxnSpPr>
+            <p:cNvPr id="85" name="Straight Connector 84"/>
+            <p:cNvCxnSpPr/>
+            <p:nvPr/>
+          </p:nvCxnSpPr>
+          <p:spPr>
+            <a:xfrm flipH="1">
+              <a:off x="5560391" y="3369152"/>
+              <a:ext cx="193622" cy="152400"/>
+            </a:xfrm>
+            <a:prstGeom prst="line">
+              <a:avLst/>
+            </a:prstGeom>
+            <a:ln>
+              <a:solidFill>
+                <a:srgbClr val="000000"/>
+              </a:solidFill>
+            </a:ln>
+          </p:spPr>
+          <p:style>
+            <a:lnRef idx="2">
+              <a:schemeClr val="accent1"/>
+            </a:lnRef>
+            <a:fillRef idx="0">
+              <a:schemeClr val="accent1"/>
+            </a:fillRef>
+            <a:effectRef idx="1">
+              <a:schemeClr val="accent1"/>
+            </a:effectRef>
+            <a:fontRef idx="minor">
+              <a:schemeClr val="tx1"/>
+            </a:fontRef>
+          </p:style>
+        </p:cxnSp>
+        <p:cxnSp>
+          <p:nvCxnSpPr>
+            <p:cNvPr id="86" name="Straight Connector 85"/>
+            <p:cNvCxnSpPr/>
+            <p:nvPr/>
+          </p:nvCxnSpPr>
+          <p:spPr>
+            <a:xfrm flipH="1" flipV="1">
+              <a:off x="5755991" y="3383312"/>
+              <a:ext cx="193622" cy="152400"/>
+            </a:xfrm>
+            <a:prstGeom prst="line">
+              <a:avLst/>
+            </a:prstGeom>
+            <a:ln>
+              <a:solidFill>
+                <a:srgbClr val="000000"/>
+              </a:solidFill>
+            </a:ln>
+          </p:spPr>
+          <p:style>
+            <a:lnRef idx="2">
+              <a:schemeClr val="accent1"/>
+            </a:lnRef>
+            <a:fillRef idx="0">
+              <a:schemeClr val="accent1"/>
+            </a:fillRef>
+            <a:effectRef idx="1">
+              <a:schemeClr val="accent1"/>
+            </a:effectRef>
+            <a:fontRef idx="minor">
+              <a:schemeClr val="tx1"/>
+            </a:fontRef>
+          </p:style>
+        </p:cxnSp>
+        <p:cxnSp>
+          <p:nvCxnSpPr>
+            <p:cNvPr id="87" name="Straight Connector 86"/>
+            <p:cNvCxnSpPr/>
+            <p:nvPr/>
+          </p:nvCxnSpPr>
+          <p:spPr>
+            <a:xfrm flipH="1" flipV="1">
+              <a:off x="5757066" y="3006497"/>
+              <a:ext cx="193622" cy="152400"/>
+            </a:xfrm>
+            <a:prstGeom prst="line">
+              <a:avLst/>
+            </a:prstGeom>
+            <a:ln>
+              <a:solidFill>
+                <a:srgbClr val="000000"/>
+              </a:solidFill>
+            </a:ln>
+          </p:spPr>
+          <p:style>
+            <a:lnRef idx="2">
+              <a:schemeClr val="accent1"/>
+            </a:lnRef>
+            <a:fillRef idx="0">
+              <a:schemeClr val="accent1"/>
+            </a:fillRef>
+            <a:effectRef idx="1">
+              <a:schemeClr val="accent1"/>
+            </a:effectRef>
+            <a:fontRef idx="minor">
+              <a:schemeClr val="tx1"/>
+            </a:fontRef>
+          </p:style>
+        </p:cxnSp>
+      </p:grpSp>
+    </p:spTree>
+    <p:extLst>
+      <p:ext uri="{BB962C8B-B14F-4D97-AF65-F5344CB8AC3E}">
+        <p14:creationId xmlns:p14="http://schemas.microsoft.com/office/powerpoint/2010/main" val="470796072"/>
+      </p:ext>
+    </p:extLst>
+  </p:cSld>
+  <p:clrMapOvr>
+    <a:masterClrMapping/>
+  </p:clrMapOvr>
+</p:sld>
+</file>
+
+<file path=ppt/slides/slide2.xml><?xml version="1.0" encoding="utf-8"?>
+<p:sld xmlns:a="http://schemas.openxmlformats.org/drawingml/2006/main" xmlns:r="http://schemas.openxmlformats.org/officeDocument/2006/relationships" xmlns:p="http://schemas.openxmlformats.org/presentationml/2006/main">
+  <p:cSld>
+    <p:spTree>
+      <p:nvGrpSpPr>
+        <p:cNvPr id="1" name=""/>
+        <p:cNvGrpSpPr/>
+        <p:nvPr/>
+      </p:nvGrpSpPr>
+      <p:grpSpPr>
+        <a:xfrm>
+          <a:off x="0" y="0"/>
+          <a:ext cx="0" cy="0"/>
+          <a:chOff x="0" y="0"/>
+          <a:chExt cx="0" cy="0"/>
+        </a:xfrm>
+      </p:grpSpPr>
+      <p:sp>
+        <p:nvSpPr>
+          <p:cNvPr id="5" name="TextBox 4"/>
+          <p:cNvSpPr txBox="1"/>
+          <p:nvPr/>
+        </p:nvSpPr>
+        <p:spPr>
+          <a:xfrm>
             <a:off x="841676" y="1496311"/>
             <a:ext cx="2028395" cy="646331"/>
           </a:xfrm>
@@ -3474,134 +5920,6 @@
 </p:sld>
 </file>
 
-<file path=ppt/slides/slide2.xml><?xml version="1.0" encoding="utf-8"?>
-<p:sld xmlns:a="http://schemas.openxmlformats.org/drawingml/2006/main" xmlns:r="http://schemas.openxmlformats.org/officeDocument/2006/relationships" xmlns:p="http://schemas.openxmlformats.org/presentationml/2006/main">
-  <p:cSld>
-    <p:spTree>
-      <p:nvGrpSpPr>
-        <p:cNvPr id="1" name=""/>
-        <p:cNvGrpSpPr/>
-        <p:nvPr/>
-      </p:nvGrpSpPr>
-      <p:grpSpPr>
-        <a:xfrm>
-          <a:off x="0" y="0"/>
-          <a:ext cx="0" cy="0"/>
-          <a:chOff x="0" y="0"/>
-          <a:chExt cx="0" cy="0"/>
-        </a:xfrm>
-      </p:grpSpPr>
-      <p:sp>
-        <p:nvSpPr>
-          <p:cNvPr id="2" name="Title 1"/>
-          <p:cNvSpPr>
-            <a:spLocks noGrp="1"/>
-          </p:cNvSpPr>
-          <p:nvPr>
-            <p:ph type="title"/>
-          </p:nvPr>
-        </p:nvSpPr>
-        <p:spPr/>
-        <p:txBody>
-          <a:bodyPr/>
-          <a:lstStyle/>
-          <a:p>
-            <a:r>
-              <a:rPr lang="en-US" dirty="0" smtClean="0"/>
-              <a:t>Chicken </a:t>
-            </a:r>
-            <a:r>
-              <a:rPr lang="en-US" dirty="0" err="1" smtClean="0"/>
-              <a:t>vs</a:t>
-            </a:r>
-            <a:r>
-              <a:rPr lang="en-US" dirty="0" smtClean="0"/>
-              <a:t> egg</a:t>
-            </a:r>
-            <a:endParaRPr lang="en-US" dirty="0"/>
-          </a:p>
-        </p:txBody>
-      </p:sp>
-      <p:sp>
-        <p:nvSpPr>
-          <p:cNvPr id="3" name="Content Placeholder 2"/>
-          <p:cNvSpPr>
-            <a:spLocks noGrp="1"/>
-          </p:cNvSpPr>
-          <p:nvPr>
-            <p:ph idx="1"/>
-          </p:nvPr>
-        </p:nvSpPr>
-        <p:spPr/>
-        <p:txBody>
-          <a:bodyPr>
-            <a:normAutofit fontScale="92500" lnSpcReduction="10000"/>
-          </a:bodyPr>
-          <a:lstStyle/>
-          <a:p>
-            <a:r>
-              <a:rPr lang="en-US" dirty="0" smtClean="0"/>
-              <a:t>Which comes first the language or the analysis?</a:t>
-            </a:r>
-          </a:p>
-          <a:p>
-            <a:endParaRPr lang="en-US" dirty="0"/>
-          </a:p>
-          <a:p>
-            <a:pPr lvl="1"/>
-            <a:r>
-              <a:rPr lang="en-US" dirty="0" smtClean="0"/>
-              <a:t>Step 1: (Person A) Design a Language </a:t>
-            </a:r>
-          </a:p>
-          <a:p>
-            <a:pPr lvl="1"/>
-            <a:r>
-              <a:rPr lang="en-US" dirty="0" smtClean="0"/>
-              <a:t>Step 2: (Person B .ne. A)Try to make it fast, perhaps with heroics such as static analysis or other analysis ( or this may not happen)</a:t>
-            </a:r>
-          </a:p>
-          <a:p>
-            <a:pPr lvl="1"/>
-            <a:endParaRPr lang="en-US" dirty="0" smtClean="0"/>
-          </a:p>
-          <a:p>
-            <a:pPr lvl="1"/>
-            <a:r>
-              <a:rPr lang="en-US" dirty="0" smtClean="0"/>
-              <a:t>Julia Innovation: Building by Design</a:t>
-            </a:r>
-          </a:p>
-          <a:p>
-            <a:pPr lvl="1"/>
-            <a:r>
-              <a:rPr lang="en-US" dirty="0" smtClean="0"/>
-              <a:t>Step 1: Analyze for speed</a:t>
-            </a:r>
-          </a:p>
-          <a:p>
-            <a:pPr lvl="1"/>
-            <a:r>
-              <a:rPr lang="en-US" dirty="0" smtClean="0"/>
-              <a:t>Step 2: Design Language Around Analysis</a:t>
-            </a:r>
-            <a:endParaRPr lang="en-US" dirty="0"/>
-          </a:p>
-        </p:txBody>
-      </p:sp>
-    </p:spTree>
-    <p:extLst>
-      <p:ext uri="{BB962C8B-B14F-4D97-AF65-F5344CB8AC3E}">
-        <p14:creationId xmlns:p14="http://schemas.microsoft.com/office/powerpoint/2010/main" val="3359663547"/>
-      </p:ext>
-    </p:extLst>
-  </p:cSld>
-  <p:clrMapOvr>
-    <a:masterClrMapping/>
-  </p:clrMapOvr>
-</p:sld>
-</file>
-
 <file path=ppt/slides/slide3.xml><?xml version="1.0" encoding="utf-8"?>
 <p:sld xmlns:a="http://schemas.openxmlformats.org/drawingml/2006/main" xmlns:r="http://schemas.openxmlformats.org/officeDocument/2006/relationships" xmlns:p="http://schemas.openxmlformats.org/presentationml/2006/main">
   <p:cSld>
@@ -3621,522 +5939,97 @@
       </p:grpSpPr>
       <p:sp>
         <p:nvSpPr>
-          <p:cNvPr id="5" name="TextBox 4"/>
-          <p:cNvSpPr txBox="1"/>
-          <p:nvPr/>
-        </p:nvSpPr>
-        <p:spPr>
-          <a:xfrm>
-            <a:off x="324857" y="1978944"/>
-            <a:ext cx="8682555" cy="2308324"/>
-          </a:xfrm>
-          <a:prstGeom prst="rect">
-            <a:avLst/>
-          </a:prstGeom>
-          <a:noFill/>
-        </p:spPr>
-        <p:txBody>
-          <a:bodyPr wrap="square" rtlCol="0">
-            <a:spAutoFit/>
+          <p:cNvPr id="2" name="Title 1"/>
+          <p:cNvSpPr>
+            <a:spLocks noGrp="1"/>
+          </p:cNvSpPr>
+          <p:nvPr>
+            <p:ph type="title"/>
+          </p:nvPr>
+        </p:nvSpPr>
+        <p:spPr/>
+        <p:txBody>
+          <a:bodyPr/>
+          <a:lstStyle/>
+          <a:p>
+            <a:r>
+              <a:rPr lang="en-US" dirty="0" smtClean="0"/>
+              <a:t>Chicken </a:t>
+            </a:r>
+            <a:r>
+              <a:rPr lang="en-US" dirty="0" err="1" smtClean="0"/>
+              <a:t>vs</a:t>
+            </a:r>
+            <a:r>
+              <a:rPr lang="en-US" dirty="0" smtClean="0"/>
+              <a:t> egg</a:t>
+            </a:r>
+            <a:endParaRPr lang="en-US" dirty="0"/>
+          </a:p>
+        </p:txBody>
+      </p:sp>
+      <p:sp>
+        <p:nvSpPr>
+          <p:cNvPr id="3" name="Content Placeholder 2"/>
+          <p:cNvSpPr>
+            <a:spLocks noGrp="1"/>
+          </p:cNvSpPr>
+          <p:nvPr>
+            <p:ph idx="1"/>
+          </p:nvPr>
+        </p:nvSpPr>
+        <p:spPr/>
+        <p:txBody>
+          <a:bodyPr>
+            <a:normAutofit fontScale="92500" lnSpcReduction="10000"/>
           </a:bodyPr>
           <a:lstStyle/>
           <a:p>
             <a:r>
               <a:rPr lang="en-US" dirty="0" smtClean="0"/>
-              <a:t>Historical:    (1) Design Language                                    (2)  Design an Analysis</a:t>
-            </a:r>
-          </a:p>
-          <a:p>
+              <a:t>Which comes first the language or the analysis?</a:t>
+            </a:r>
+          </a:p>
+          <a:p>
+            <a:endParaRPr lang="en-US" dirty="0"/>
+          </a:p>
+          <a:p>
+            <a:pPr lvl="1"/>
+            <a:r>
+              <a:rPr lang="en-US" dirty="0" smtClean="0"/>
+              <a:t>Step 1: (Person A) Design a Language </a:t>
+            </a:r>
+          </a:p>
+          <a:p>
+            <a:pPr lvl="1"/>
+            <a:r>
+              <a:rPr lang="en-US" dirty="0" smtClean="0"/>
+              <a:t>Step 2: (Person B .ne. A)Try to make it fast, perhaps with heroics such as static analysis or other analysis ( or this may not happen)</a:t>
+            </a:r>
+          </a:p>
+          <a:p>
+            <a:pPr lvl="1"/>
             <a:endParaRPr lang="en-US" dirty="0" smtClean="0"/>
           </a:p>
           <a:p>
-            <a:endParaRPr lang="en-US" dirty="0" smtClean="0"/>
-          </a:p>
-          <a:p>
-            <a:endParaRPr lang="en-US" dirty="0" smtClean="0"/>
-          </a:p>
-          <a:p>
-            <a:endParaRPr lang="en-US" dirty="0" smtClean="0"/>
-          </a:p>
-          <a:p>
-            <a:endParaRPr lang="en-US" dirty="0" smtClean="0"/>
-          </a:p>
-          <a:p>
-            <a:endParaRPr lang="en-US" dirty="0" smtClean="0"/>
-          </a:p>
-          <a:p>
+            <a:pPr lvl="1"/>
             <a:r>
               <a:rPr lang="en-US" dirty="0" smtClean="0"/>
-              <a:t>Julia:                                                                 </a:t>
-            </a:r>
-            <a:endParaRPr lang="en-US" dirty="0"/>
-          </a:p>
-        </p:txBody>
-      </p:sp>
-      <p:sp>
-        <p:nvSpPr>
-          <p:cNvPr id="9" name="Curved Down Arrow 8"/>
-          <p:cNvSpPr/>
-          <p:nvPr/>
-        </p:nvSpPr>
-        <p:spPr>
-          <a:xfrm>
-            <a:off x="3780160" y="3618218"/>
-            <a:ext cx="1683352" cy="731520"/>
-          </a:xfrm>
-          <a:prstGeom prst="curvedDownArrow">
-            <a:avLst/>
-          </a:prstGeom>
-        </p:spPr>
-        <p:style>
-          <a:lnRef idx="1">
-            <a:schemeClr val="accent1"/>
-          </a:lnRef>
-          <a:fillRef idx="3">
-            <a:schemeClr val="accent1"/>
-          </a:fillRef>
-          <a:effectRef idx="2">
-            <a:schemeClr val="accent1"/>
-          </a:effectRef>
-          <a:fontRef idx="minor">
-            <a:schemeClr val="lt1"/>
-          </a:fontRef>
-        </p:style>
-        <p:txBody>
-          <a:bodyPr rtlCol="0" anchor="ctr"/>
-          <a:lstStyle/>
-          <a:p>
-            <a:pPr algn="ctr"/>
-            <a:endParaRPr lang="en-US">
-              <a:solidFill>
-                <a:schemeClr val="tx1"/>
-              </a:solidFill>
-            </a:endParaRPr>
-          </a:p>
-        </p:txBody>
-      </p:sp>
-      <p:sp>
-        <p:nvSpPr>
-          <p:cNvPr id="10" name="Curved Down Arrow 9"/>
-          <p:cNvSpPr/>
-          <p:nvPr/>
-        </p:nvSpPr>
-        <p:spPr>
-          <a:xfrm rot="10636884">
-            <a:off x="3763222" y="4733808"/>
-            <a:ext cx="1701650" cy="731520"/>
-          </a:xfrm>
-          <a:prstGeom prst="curvedDownArrow">
-            <a:avLst/>
-          </a:prstGeom>
-        </p:spPr>
-        <p:style>
-          <a:lnRef idx="1">
-            <a:schemeClr val="accent1"/>
-          </a:lnRef>
-          <a:fillRef idx="3">
-            <a:schemeClr val="accent1"/>
-          </a:fillRef>
-          <a:effectRef idx="2">
-            <a:schemeClr val="accent1"/>
-          </a:effectRef>
-          <a:fontRef idx="minor">
-            <a:schemeClr val="lt1"/>
-          </a:fontRef>
-        </p:style>
-        <p:txBody>
-          <a:bodyPr rtlCol="0" anchor="ctr"/>
-          <a:lstStyle/>
-          <a:p>
-            <a:pPr algn="ctr"/>
-            <a:endParaRPr lang="en-US">
-              <a:solidFill>
-                <a:schemeClr val="tx1"/>
-              </a:solidFill>
-            </a:endParaRPr>
-          </a:p>
-        </p:txBody>
-      </p:sp>
-      <p:sp>
-        <p:nvSpPr>
-          <p:cNvPr id="11" name="TextBox 10"/>
-          <p:cNvSpPr txBox="1"/>
-          <p:nvPr/>
-        </p:nvSpPr>
-        <p:spPr>
-          <a:xfrm>
-            <a:off x="3263341" y="605498"/>
-            <a:ext cx="2625313" cy="369332"/>
-          </a:xfrm>
-          <a:prstGeom prst="rect">
-            <a:avLst/>
-          </a:prstGeom>
-          <a:noFill/>
-        </p:spPr>
-        <p:txBody>
-          <a:bodyPr wrap="none" rtlCol="0">
-            <a:spAutoFit/>
-          </a:bodyPr>
-          <a:lstStyle/>
-          <a:p>
+              <a:t>Julia Innovation: Building by Design</a:t>
+            </a:r>
+          </a:p>
+          <a:p>
+            <a:pPr lvl="1"/>
             <a:r>
               <a:rPr lang="en-US" dirty="0" smtClean="0"/>
-              <a:t>Dynamic Language Design  </a:t>
-            </a:r>
-            <a:endParaRPr lang="en-US" dirty="0"/>
-          </a:p>
-        </p:txBody>
-      </p:sp>
-      <p:sp>
-        <p:nvSpPr>
-          <p:cNvPr id="12" name="TextBox 11"/>
-          <p:cNvSpPr txBox="1"/>
-          <p:nvPr/>
-        </p:nvSpPr>
-        <p:spPr>
-          <a:xfrm>
-            <a:off x="2362600" y="4347559"/>
-            <a:ext cx="1759804" cy="369332"/>
-          </a:xfrm>
-          <a:prstGeom prst="rect">
-            <a:avLst/>
-          </a:prstGeom>
-          <a:noFill/>
-        </p:spPr>
-        <p:txBody>
-          <a:bodyPr wrap="none" rtlCol="0">
-            <a:spAutoFit/>
-          </a:bodyPr>
-          <a:lstStyle/>
-          <a:p>
+              <a:t>Step 1: Analyze for speed</a:t>
+            </a:r>
+          </a:p>
+          <a:p>
+            <a:pPr lvl="1"/>
             <a:r>
               <a:rPr lang="en-US" dirty="0" smtClean="0"/>
-              <a:t>Design Language</a:t>
-            </a:r>
-            <a:endParaRPr lang="en-US" dirty="0"/>
-          </a:p>
-        </p:txBody>
-      </p:sp>
-      <p:sp>
-        <p:nvSpPr>
-          <p:cNvPr id="13" name="TextBox 12"/>
-          <p:cNvSpPr txBox="1"/>
-          <p:nvPr/>
-        </p:nvSpPr>
-        <p:spPr>
-          <a:xfrm>
-            <a:off x="4934982" y="4349738"/>
-            <a:ext cx="1907343" cy="369332"/>
-          </a:xfrm>
-          <a:prstGeom prst="rect">
-            <a:avLst/>
-          </a:prstGeom>
-          <a:noFill/>
-        </p:spPr>
-        <p:txBody>
-          <a:bodyPr wrap="none" rtlCol="0">
-            <a:spAutoFit/>
-          </a:bodyPr>
-          <a:lstStyle/>
-          <a:p>
-            <a:r>
-              <a:rPr lang="en-US" dirty="0" smtClean="0"/>
-              <a:t>Design an Analysis</a:t>
-            </a:r>
-            <a:endParaRPr lang="en-US" dirty="0"/>
-          </a:p>
-        </p:txBody>
-      </p:sp>
-      <p:sp>
-        <p:nvSpPr>
-          <p:cNvPr id="14" name="TextBox 13"/>
-          <p:cNvSpPr txBox="1"/>
-          <p:nvPr/>
-        </p:nvSpPr>
-        <p:spPr>
-          <a:xfrm>
-            <a:off x="397350" y="2599209"/>
-            <a:ext cx="3349482" cy="369332"/>
-          </a:xfrm>
-          <a:prstGeom prst="rect">
-            <a:avLst/>
-          </a:prstGeom>
-          <a:noFill/>
-        </p:spPr>
-        <p:txBody>
-          <a:bodyPr wrap="none" rtlCol="0">
-            <a:spAutoFit/>
-          </a:bodyPr>
-          <a:lstStyle/>
-          <a:p>
-            <a:r>
-              <a:rPr lang="en-US" dirty="0" err="1" smtClean="0"/>
-              <a:t>Mathematica</a:t>
-            </a:r>
-            <a:r>
-              <a:rPr lang="en-US" dirty="0" smtClean="0"/>
-              <a:t>, R, MATLAB, Octave </a:t>
-            </a:r>
-            <a:endParaRPr lang="en-US" dirty="0"/>
-          </a:p>
-        </p:txBody>
-      </p:sp>
-      <p:sp>
-        <p:nvSpPr>
-          <p:cNvPr id="15" name="TextBox 14"/>
-          <p:cNvSpPr txBox="1"/>
-          <p:nvPr/>
-        </p:nvSpPr>
-        <p:spPr>
-          <a:xfrm>
-            <a:off x="772922" y="6040209"/>
-            <a:ext cx="7417791" cy="646331"/>
-          </a:xfrm>
-          <a:prstGeom prst="rect">
-            <a:avLst/>
-          </a:prstGeom>
-          <a:noFill/>
-        </p:spPr>
-        <p:txBody>
-          <a:bodyPr wrap="none" rtlCol="0">
-            <a:spAutoFit/>
-          </a:bodyPr>
-          <a:lstStyle/>
-          <a:p>
-            <a:r>
-              <a:rPr lang="en-US" dirty="0" smtClean="0"/>
-              <a:t>Analysis is a process to extract information from a program in some language</a:t>
-            </a:r>
-          </a:p>
-          <a:p>
-            <a:r>
-              <a:rPr lang="en-US" dirty="0" smtClean="0"/>
-              <a:t>for example types, whether a variable is defined, whether a loop terminates…</a:t>
-            </a:r>
-          </a:p>
-        </p:txBody>
-      </p:sp>
-      <p:sp>
-        <p:nvSpPr>
-          <p:cNvPr id="16" name="Right Arrow 15"/>
-          <p:cNvSpPr/>
-          <p:nvPr/>
-        </p:nvSpPr>
-        <p:spPr>
-          <a:xfrm>
-            <a:off x="3573432" y="1978944"/>
-            <a:ext cx="1579989" cy="406063"/>
-          </a:xfrm>
-          <a:prstGeom prst="rightArrow">
-            <a:avLst/>
-          </a:prstGeom>
-        </p:spPr>
-        <p:style>
-          <a:lnRef idx="1">
-            <a:schemeClr val="accent1"/>
-          </a:lnRef>
-          <a:fillRef idx="3">
-            <a:schemeClr val="accent1"/>
-          </a:fillRef>
-          <a:effectRef idx="2">
-            <a:schemeClr val="accent1"/>
-          </a:effectRef>
-          <a:fontRef idx="minor">
-            <a:schemeClr val="lt1"/>
-          </a:fontRef>
-        </p:style>
-        <p:txBody>
-          <a:bodyPr rtlCol="0" anchor="ctr"/>
-          <a:lstStyle/>
-          <a:p>
-            <a:pPr algn="ctr"/>
-            <a:endParaRPr lang="en-US"/>
-          </a:p>
-        </p:txBody>
-      </p:sp>
-      <p:pic>
-        <p:nvPicPr>
-          <p:cNvPr id="17" name="Picture 16"/>
-          <p:cNvPicPr>
-            <a:picLocks noChangeAspect="1"/>
-          </p:cNvPicPr>
-          <p:nvPr/>
-        </p:nvPicPr>
-        <p:blipFill>
-          <a:blip r:embed="rId2"/>
-          <a:stretch>
-            <a:fillRect/>
-          </a:stretch>
-        </p:blipFill>
-        <p:spPr>
-          <a:xfrm flipH="1">
-            <a:off x="2362600" y="1134180"/>
-            <a:ext cx="598375" cy="844764"/>
-          </a:xfrm>
-          <a:prstGeom prst="rect">
-            <a:avLst/>
-          </a:prstGeom>
-        </p:spPr>
-      </p:pic>
-      <p:pic>
-        <p:nvPicPr>
-          <p:cNvPr id="18" name="Picture 17"/>
-          <p:cNvPicPr>
-            <a:picLocks noChangeAspect="1"/>
-          </p:cNvPicPr>
-          <p:nvPr/>
-        </p:nvPicPr>
-        <p:blipFill>
-          <a:blip r:embed="rId2"/>
-          <a:stretch>
-            <a:fillRect/>
-          </a:stretch>
-        </p:blipFill>
-        <p:spPr>
-          <a:xfrm flipH="1">
-            <a:off x="5992018" y="974830"/>
-            <a:ext cx="598375" cy="844764"/>
-          </a:xfrm>
-          <a:prstGeom prst="rect">
-            <a:avLst/>
-          </a:prstGeom>
-        </p:spPr>
-      </p:pic>
-      <p:pic>
-        <p:nvPicPr>
-          <p:cNvPr id="19" name="Picture 18"/>
-          <p:cNvPicPr>
-            <a:picLocks noChangeAspect="1"/>
-          </p:cNvPicPr>
-          <p:nvPr/>
-        </p:nvPicPr>
-        <p:blipFill>
-          <a:blip r:embed="rId2"/>
-          <a:stretch>
-            <a:fillRect/>
-          </a:stretch>
-        </p:blipFill>
-        <p:spPr>
-          <a:xfrm>
-            <a:off x="4151005" y="4275377"/>
-            <a:ext cx="373962" cy="527946"/>
-          </a:xfrm>
-          <a:prstGeom prst="rect">
-            <a:avLst/>
-          </a:prstGeom>
-        </p:spPr>
-      </p:pic>
-      <p:pic>
-        <p:nvPicPr>
-          <p:cNvPr id="21" name="Picture 20"/>
-          <p:cNvPicPr>
-            <a:picLocks noChangeAspect="1"/>
-          </p:cNvPicPr>
-          <p:nvPr/>
-        </p:nvPicPr>
-        <p:blipFill>
-          <a:blip r:embed="rId2"/>
-          <a:stretch>
-            <a:fillRect/>
-          </a:stretch>
-        </p:blipFill>
-        <p:spPr>
-          <a:xfrm>
-            <a:off x="4524967" y="4260443"/>
-            <a:ext cx="373962" cy="527946"/>
-          </a:xfrm>
-          <a:prstGeom prst="rect">
-            <a:avLst/>
-          </a:prstGeom>
-        </p:spPr>
-      </p:pic>
-      <p:pic>
-        <p:nvPicPr>
-          <p:cNvPr id="22" name="Picture 21"/>
-          <p:cNvPicPr>
-            <a:picLocks noChangeAspect="1"/>
-          </p:cNvPicPr>
-          <p:nvPr/>
-        </p:nvPicPr>
-        <p:blipFill>
-          <a:blip r:embed="rId3"/>
-          <a:stretch>
-            <a:fillRect/>
-          </a:stretch>
-        </p:blipFill>
-        <p:spPr>
-          <a:xfrm>
-            <a:off x="7262019" y="165802"/>
-            <a:ext cx="1857388" cy="1393041"/>
-          </a:xfrm>
-          <a:prstGeom prst="rect">
-            <a:avLst/>
-          </a:prstGeom>
-        </p:spPr>
-      </p:pic>
-      <p:sp>
-        <p:nvSpPr>
-          <p:cNvPr id="23" name="Right Arrow 22"/>
-          <p:cNvSpPr/>
-          <p:nvPr/>
-        </p:nvSpPr>
-        <p:spPr>
-          <a:xfrm rot="3038555">
-            <a:off x="6142760" y="2466169"/>
-            <a:ext cx="1237627" cy="502372"/>
-          </a:xfrm>
-          <a:prstGeom prst="rightArrow">
-            <a:avLst/>
-          </a:prstGeom>
-        </p:spPr>
-        <p:style>
-          <a:lnRef idx="1">
-            <a:schemeClr val="accent1"/>
-          </a:lnRef>
-          <a:fillRef idx="3">
-            <a:schemeClr val="accent1"/>
-          </a:fillRef>
-          <a:effectRef idx="2">
-            <a:schemeClr val="accent1"/>
-          </a:effectRef>
-          <a:fontRef idx="minor">
-            <a:schemeClr val="lt1"/>
-          </a:fontRef>
-        </p:style>
-        <p:txBody>
-          <a:bodyPr rtlCol="0" anchor="ctr"/>
-          <a:lstStyle/>
-          <a:p>
-            <a:pPr algn="ctr"/>
-            <a:endParaRPr lang="en-US"/>
-          </a:p>
-        </p:txBody>
-      </p:sp>
-      <p:sp>
-        <p:nvSpPr>
-          <p:cNvPr id="24" name="TextBox 23"/>
-          <p:cNvSpPr txBox="1"/>
-          <p:nvPr/>
-        </p:nvSpPr>
-        <p:spPr>
-          <a:xfrm>
-            <a:off x="6467617" y="3470536"/>
-            <a:ext cx="2100981" cy="369332"/>
-          </a:xfrm>
-          <a:prstGeom prst="rect">
-            <a:avLst/>
-          </a:prstGeom>
-          <a:noFill/>
-        </p:spPr>
-        <p:txBody>
-          <a:bodyPr wrap="none" rtlCol="0">
-            <a:spAutoFit/>
-          </a:bodyPr>
-          <a:lstStyle/>
-          <a:p>
-            <a:r>
-              <a:rPr lang="en-US" dirty="0" smtClean="0"/>
-              <a:t>optionally repeat (2)</a:t>
+              <a:t>Step 2: Design Language Around Analysis</a:t>
             </a:r>
             <a:endParaRPr lang="en-US" dirty="0"/>
           </a:p>
@@ -4145,7 +6038,7 @@
     </p:spTree>
     <p:extLst>
       <p:ext uri="{BB962C8B-B14F-4D97-AF65-F5344CB8AC3E}">
-        <p14:creationId xmlns:p14="http://schemas.microsoft.com/office/powerpoint/2010/main" val="470796072"/>
+        <p14:creationId xmlns:p14="http://schemas.microsoft.com/office/powerpoint/2010/main" val="3359663547"/>
       </p:ext>
     </p:extLst>
   </p:cSld>

</xml_diff>